<commit_message>
basic gitbook updates for fall 2022
</commit_message>
<xml_diff>
--- a/Week09/JavaScriptObjects.pptx
+++ b/Week09/JavaScriptObjects.pptx
@@ -221,7 +221,7 @@
           <a:p>
             <a:fld id="{19104133-B5B0-4351-8158-4F0E5EB1E2BF}" type="datetimeFigureOut">
               <a:rPr lang="en-US" smtClean="0"/>
-              <a:t>4/13/2020</a:t>
+              <a:t>8/25/2021</a:t>
             </a:fld>
             <a:endParaRPr lang="en-US"/>
           </a:p>
@@ -285,38 +285,37 @@
           <a:p>
             <a:pPr lvl="0"/>
             <a:r>
-              <a:rPr lang="en-US" smtClean="0"/>
+              <a:rPr lang="en-US"/>
               <a:t>Edit Master text styles</a:t>
             </a:r>
           </a:p>
           <a:p>
             <a:pPr lvl="1"/>
             <a:r>
-              <a:rPr lang="en-US" smtClean="0"/>
+              <a:rPr lang="en-US"/>
               <a:t>Second level</a:t>
             </a:r>
           </a:p>
           <a:p>
             <a:pPr lvl="2"/>
             <a:r>
-              <a:rPr lang="en-US" smtClean="0"/>
+              <a:rPr lang="en-US"/>
               <a:t>Third level</a:t>
             </a:r>
           </a:p>
           <a:p>
             <a:pPr lvl="3"/>
             <a:r>
-              <a:rPr lang="en-US" smtClean="0"/>
+              <a:rPr lang="en-US"/>
               <a:t>Fourth level</a:t>
             </a:r>
           </a:p>
           <a:p>
             <a:pPr lvl="4"/>
             <a:r>
-              <a:rPr lang="en-US" smtClean="0"/>
+              <a:rPr lang="en-US"/>
               <a:t>Fifth level</a:t>
             </a:r>
-            <a:endParaRPr lang="en-US"/>
           </a:p>
         </p:txBody>
       </p:sp>
@@ -534,29 +533,29 @@
           <a:lstStyle/>
           <a:p>
             <a:r>
-              <a:rPr lang="en-US" dirty="0" smtClean="0"/>
+              <a:rPr lang="en-US" dirty="0"/>
               <a:t>Introduce the idea of related variables all grouped together.</a:t>
             </a:r>
           </a:p>
           <a:p>
-            <a:endParaRPr lang="en-US" dirty="0" smtClean="0"/>
-          </a:p>
-          <a:p>
-            <a:r>
-              <a:rPr lang="en-US" dirty="0" smtClean="0"/>
+            <a:endParaRPr lang="en-US" dirty="0"/>
+          </a:p>
+          <a:p>
+            <a:r>
+              <a:rPr lang="en-US" dirty="0"/>
               <a:t>All of these variables are properties of a person,</a:t>
             </a:r>
             <a:r>
-              <a:rPr lang="en-US" baseline="0" dirty="0" smtClean="0"/>
+              <a:rPr lang="en-US" baseline="0" dirty="0"/>
               <a:t> but they all exist separately.</a:t>
             </a:r>
           </a:p>
           <a:p>
-            <a:endParaRPr lang="en-US" baseline="0" dirty="0" smtClean="0"/>
-          </a:p>
-          <a:p>
-            <a:r>
-              <a:rPr lang="en-US" baseline="0" dirty="0" smtClean="0"/>
+            <a:endParaRPr lang="en-US" baseline="0" dirty="0"/>
+          </a:p>
+          <a:p>
+            <a:r>
+              <a:rPr lang="en-US" baseline="0" dirty="0"/>
               <a:t>Objects could be used to group these properties together.</a:t>
             </a:r>
             <a:endParaRPr lang="en-US" dirty="0"/>
@@ -644,11 +643,11 @@
           <a:lstStyle/>
           <a:p>
             <a:r>
-              <a:rPr lang="en-US" b="0" dirty="0" smtClean="0"/>
+              <a:rPr lang="en-US" b="0" dirty="0"/>
               <a:t>For this part, go around the room (or</a:t>
             </a:r>
             <a:r>
-              <a:rPr lang="en-US" b="0" baseline="0" dirty="0" smtClean="0"/>
+              <a:rPr lang="en-US" b="0" baseline="0" dirty="0"/>
               <a:t> ask students to come up to the whiteboard) to answer the questions.</a:t>
             </a:r>
           </a:p>
@@ -735,11 +734,11 @@
           <a:lstStyle/>
           <a:p>
             <a:r>
-              <a:rPr lang="en-US" b="0" dirty="0" smtClean="0"/>
+              <a:rPr lang="en-US" b="0" dirty="0"/>
               <a:t>For this part, go around the room (or</a:t>
             </a:r>
             <a:r>
-              <a:rPr lang="en-US" b="0" baseline="0" dirty="0" smtClean="0"/>
+              <a:rPr lang="en-US" b="0" baseline="0" dirty="0"/>
               <a:t> ask students to come up to the whiteboard) to answer the questions.</a:t>
             </a:r>
           </a:p>
@@ -826,11 +825,11 @@
           <a:lstStyle/>
           <a:p>
             <a:r>
-              <a:rPr lang="en-US" b="0" dirty="0" smtClean="0"/>
+              <a:rPr lang="en-US" b="0" dirty="0"/>
               <a:t>For this part, go around the room (or</a:t>
             </a:r>
             <a:r>
-              <a:rPr lang="en-US" b="0" baseline="0" dirty="0" smtClean="0"/>
+              <a:rPr lang="en-US" b="0" baseline="0" dirty="0"/>
               <a:t> ask students to come up to the whiteboard) to answer the questions.</a:t>
             </a:r>
           </a:p>
@@ -934,43 +933,43 @@
               <a:defRPr/>
             </a:pPr>
             <a:r>
-              <a:rPr lang="en-US" dirty="0" smtClean="0"/>
+              <a:rPr lang="en-US" dirty="0"/>
               <a:t>This </a:t>
             </a:r>
             <a:r>
-              <a:rPr lang="en-US" b="1" dirty="0" smtClean="0"/>
+              <a:rPr lang="en-US" b="1" dirty="0"/>
               <a:t>person</a:t>
             </a:r>
             <a:r>
-              <a:rPr lang="en-US" b="0" dirty="0" smtClean="0"/>
+              <a:rPr lang="en-US" b="0" dirty="0"/>
               <a:t> variable is now an </a:t>
             </a:r>
             <a:r>
-              <a:rPr lang="en-US" b="0" i="1" dirty="0" smtClean="0"/>
+              <a:rPr lang="en-US" b="0" i="1" dirty="0"/>
               <a:t>object</a:t>
             </a:r>
             <a:r>
-              <a:rPr lang="en-US" b="0" i="0" dirty="0" smtClean="0"/>
+              <a:rPr lang="en-US" b="0" i="0" dirty="0"/>
               <a:t> that contains multiple </a:t>
             </a:r>
             <a:r>
-              <a:rPr lang="en-US" b="0" i="1" dirty="0" smtClean="0"/>
+              <a:rPr lang="en-US" b="0" i="1" dirty="0"/>
               <a:t>properties</a:t>
             </a:r>
             <a:r>
-              <a:rPr lang="en-US" b="0" i="0" dirty="0" smtClean="0"/>
+              <a:rPr lang="en-US" b="0" i="0" dirty="0"/>
               <a:t>. </a:t>
             </a:r>
             <a:r>
-              <a:rPr lang="en-US" b="1" i="0" dirty="0" smtClean="0"/>
+              <a:rPr lang="en-US" b="1" i="0" dirty="0"/>
               <a:t>Properties</a:t>
             </a:r>
             <a:r>
-              <a:rPr lang="en-US" b="0" i="0" dirty="0" smtClean="0"/>
+              <a:rPr lang="en-US" b="0" i="0" dirty="0"/>
               <a:t> are the variables</a:t>
             </a:r>
             <a:r>
-              <a:rPr lang="en-US" b="0" i="0" baseline="0" dirty="0" smtClean="0"/>
+              <a:rPr lang="en-US" b="0" i="0" baseline="0" dirty="0"/>
               <a:t> that are part of objects.</a:t>
             </a:r>
           </a:p>
@@ -992,7 +991,7 @@
               <a:tabLst/>
               <a:defRPr/>
             </a:pPr>
-            <a:endParaRPr lang="en-US" b="0" i="0" baseline="0" dirty="0" smtClean="0"/>
+            <a:endParaRPr lang="en-US" b="0" i="0" baseline="0" dirty="0"/>
           </a:p>
           <a:p>
             <a:pPr marL="0" marR="0" lvl="0" indent="0" algn="l" defTabSz="914400" rtl="0" eaLnBrk="1" fontAlgn="auto" latinLnBrk="0" hangingPunct="1">
@@ -1013,11 +1012,11 @@
               <a:defRPr/>
             </a:pPr>
             <a:r>
-              <a:rPr lang="en-US" b="0" i="0" baseline="0" dirty="0" smtClean="0"/>
+              <a:rPr lang="en-US" b="0" i="0" baseline="0" dirty="0"/>
               <a:t>Break down the syntax for a JS object</a:t>
             </a:r>
             <a:r>
-              <a:rPr lang="en-US" baseline="0" dirty="0" smtClean="0"/>
+              <a:rPr lang="en-US" baseline="0" dirty="0"/>
               <a:t>. Make sure to make a note of each character used.</a:t>
             </a:r>
             <a:endParaRPr lang="en-US" dirty="0"/>
@@ -1105,36 +1104,36 @@
           <a:lstStyle/>
           <a:p>
             <a:r>
-              <a:rPr lang="en-US" dirty="0" smtClean="0"/>
+              <a:rPr lang="en-US" dirty="0"/>
               <a:t>Note that students</a:t>
             </a:r>
             <a:r>
-              <a:rPr lang="en-US" baseline="0" dirty="0" smtClean="0"/>
+              <a:rPr lang="en-US" baseline="0" dirty="0"/>
               <a:t> can treat </a:t>
             </a:r>
             <a:r>
-              <a:rPr lang="en-US" b="1" baseline="0" dirty="0" err="1" smtClean="0"/>
+              <a:rPr lang="en-US" b="1" baseline="0" dirty="0" err="1"/>
               <a:t>person.Name</a:t>
             </a:r>
             <a:r>
-              <a:rPr lang="en-US" b="0" baseline="0" dirty="0" smtClean="0"/>
+              <a:rPr lang="en-US" b="0" baseline="0" dirty="0"/>
               <a:t> like any other variable – they can access the value, or set the value. It will update the property on the object.</a:t>
             </a:r>
           </a:p>
           <a:p>
-            <a:endParaRPr lang="en-US" b="0" baseline="0" dirty="0" smtClean="0"/>
-          </a:p>
-          <a:p>
-            <a:r>
-              <a:rPr lang="en-US" b="0" baseline="0" dirty="0" smtClean="0"/>
+            <a:endParaRPr lang="en-US" b="0" baseline="0" dirty="0"/>
+          </a:p>
+          <a:p>
+            <a:r>
+              <a:rPr lang="en-US" b="0" baseline="0" dirty="0"/>
               <a:t>On the next slide there is a </a:t>
             </a:r>
             <a:r>
-              <a:rPr lang="en-US" b="0" baseline="0" dirty="0" err="1" smtClean="0"/>
+              <a:rPr lang="en-US" b="0" baseline="0" dirty="0" err="1"/>
               <a:t>Repl</a:t>
             </a:r>
             <a:r>
-              <a:rPr lang="en-US" b="0" baseline="0" dirty="0" smtClean="0"/>
+              <a:rPr lang="en-US" b="0" baseline="0" dirty="0"/>
               <a:t> where students can see this code in action.</a:t>
             </a:r>
             <a:endParaRPr lang="en-US" dirty="0"/>
@@ -1239,7 +1238,7 @@
               <a:defRPr/>
             </a:pPr>
             <a:r>
-              <a:rPr lang="en-US" dirty="0" smtClean="0"/>
+              <a:rPr lang="en-US" dirty="0"/>
               <a:t>Show some examples of getting and setting properties.</a:t>
             </a:r>
           </a:p>
@@ -1261,7 +1260,7 @@
               <a:tabLst/>
               <a:defRPr/>
             </a:pPr>
-            <a:endParaRPr lang="en-US" dirty="0" smtClean="0"/>
+            <a:endParaRPr lang="en-US" dirty="0"/>
           </a:p>
           <a:p>
             <a:pPr marL="0" marR="0" lvl="0" indent="0" algn="l" defTabSz="914400" rtl="0" eaLnBrk="1" fontAlgn="auto" latinLnBrk="0" hangingPunct="1">
@@ -1282,14 +1281,14 @@
               <a:defRPr/>
             </a:pPr>
             <a:r>
-              <a:rPr lang="en-US" dirty="0" smtClean="0"/>
+              <a:rPr lang="en-US" dirty="0"/>
               <a:t>Ask the students what the user would see in the </a:t>
             </a:r>
             <a:r>
-              <a:rPr lang="en-US" b="1" dirty="0" smtClean="0"/>
+              <a:rPr lang="en-US" b="1" dirty="0"/>
               <a:t>alert</a:t>
             </a:r>
-            <a:endParaRPr lang="en-US" dirty="0" smtClean="0"/>
+            <a:endParaRPr lang="en-US" dirty="0"/>
           </a:p>
           <a:p>
             <a:endParaRPr lang="en-US" dirty="0"/>
@@ -1377,24 +1376,24 @@
           <a:lstStyle/>
           <a:p>
             <a:r>
-              <a:rPr lang="en-US" dirty="0" smtClean="0"/>
+              <a:rPr lang="en-US" dirty="0"/>
               <a:t>For the </a:t>
             </a:r>
             <a:r>
-              <a:rPr lang="en-US" dirty="0" err="1" smtClean="0"/>
+              <a:rPr lang="en-US" dirty="0" err="1"/>
               <a:t>Repl</a:t>
             </a:r>
             <a:r>
-              <a:rPr lang="en-US" dirty="0" smtClean="0"/>
+              <a:rPr lang="en-US" dirty="0"/>
               <a:t>,</a:t>
             </a:r>
             <a:r>
-              <a:rPr lang="en-US" baseline="0" dirty="0" smtClean="0"/>
+              <a:rPr lang="en-US" baseline="0" dirty="0"/>
               <a:t> show objects in action. Show how to initialize a new object, and get/set property values on an object.</a:t>
             </a:r>
           </a:p>
           <a:p>
-            <a:endParaRPr lang="en-US" baseline="0" dirty="0" smtClean="0"/>
+            <a:endParaRPr lang="en-US" baseline="0" dirty="0"/>
           </a:p>
           <a:p>
             <a:pPr marL="0" marR="0" lvl="0" indent="0" algn="l" defTabSz="914400" rtl="0" eaLnBrk="1" fontAlgn="auto" latinLnBrk="0" hangingPunct="1">
@@ -1415,14 +1414,14 @@
               <a:defRPr/>
             </a:pPr>
             <a:r>
-              <a:rPr lang="en-US" dirty="0" smtClean="0"/>
+              <a:rPr lang="en-US" dirty="0"/>
               <a:t>Play around with the example, changing the values.</a:t>
             </a:r>
             <a:r>
-              <a:rPr lang="en-US" baseline="0" dirty="0" smtClean="0"/>
+              <a:rPr lang="en-US" baseline="0" dirty="0"/>
               <a:t> Consider having many menu items; in that case, these objects would be necessary to separate each group of variables</a:t>
             </a:r>
-            <a:endParaRPr lang="en-US" dirty="0" smtClean="0"/>
+            <a:endParaRPr lang="en-US" dirty="0"/>
           </a:p>
         </p:txBody>
       </p:sp>
@@ -1507,11 +1506,11 @@
           <a:lstStyle/>
           <a:p>
             <a:r>
-              <a:rPr lang="en-US" b="0" dirty="0" smtClean="0"/>
+              <a:rPr lang="en-US" b="0" dirty="0"/>
               <a:t>For this part, go around the room (or</a:t>
             </a:r>
             <a:r>
-              <a:rPr lang="en-US" b="0" baseline="0" dirty="0" smtClean="0"/>
+              <a:rPr lang="en-US" b="0" baseline="0" dirty="0"/>
               <a:t> ask students to come up to the whiteboard) to answer the questions.</a:t>
             </a:r>
           </a:p>
@@ -1598,11 +1597,11 @@
           <a:lstStyle/>
           <a:p>
             <a:r>
-              <a:rPr lang="en-US" b="0" dirty="0" smtClean="0"/>
+              <a:rPr lang="en-US" b="0" dirty="0"/>
               <a:t>For this part, go around the room (or</a:t>
             </a:r>
             <a:r>
-              <a:rPr lang="en-US" b="0" baseline="0" dirty="0" smtClean="0"/>
+              <a:rPr lang="en-US" b="0" baseline="0" dirty="0"/>
               <a:t> ask students to come up to the whiteboard) to answer the questions.</a:t>
             </a:r>
           </a:p>
@@ -1689,11 +1688,11 @@
           <a:lstStyle/>
           <a:p>
             <a:r>
-              <a:rPr lang="en-US" b="0" dirty="0" smtClean="0"/>
+              <a:rPr lang="en-US" b="0" dirty="0"/>
               <a:t>For this part, go around the room (or</a:t>
             </a:r>
             <a:r>
-              <a:rPr lang="en-US" b="0" baseline="0" dirty="0" smtClean="0"/>
+              <a:rPr lang="en-US" b="0" baseline="0" dirty="0"/>
               <a:t> ask students to come up to the whiteboard) to answer the questions.</a:t>
             </a:r>
           </a:p>
@@ -1780,11 +1779,11 @@
           <a:lstStyle/>
           <a:p>
             <a:r>
-              <a:rPr lang="en-US" b="0" dirty="0" smtClean="0"/>
+              <a:rPr lang="en-US" b="0" dirty="0"/>
               <a:t>For this part, go around the room (or</a:t>
             </a:r>
             <a:r>
-              <a:rPr lang="en-US" b="0" baseline="0" dirty="0" smtClean="0"/>
+              <a:rPr lang="en-US" b="0" baseline="0" dirty="0"/>
               <a:t> ask students to come up to the whiteboard) to answer the questions.</a:t>
             </a:r>
           </a:p>
@@ -1966,15 +1965,7 @@
           <a:p>
             <a:r>
               <a:rPr lang="en-US" dirty="0"/>
-              <a:t>Click to edit Master </a:t>
-            </a:r>
-            <a:r>
-              <a:rPr lang="en-US" dirty="0" smtClean="0"/>
-              <a:t>subtitle </a:t>
-            </a:r>
-            <a:r>
-              <a:rPr lang="en-US" dirty="0"/>
-              <a:t>style</a:t>
+              <a:t>Click to edit Master subtitle style</a:t>
             </a:r>
           </a:p>
         </p:txBody>
@@ -2016,7 +2007,7 @@
             <a:fld id="{1C2D31DE-C454-491C-B5C3-F097855E3DF7}" type="datetime4">
               <a:rPr lang="en-US" smtClean="0"/>
               <a:pPr/>
-              <a:t>April 13, 2020</a:t>
+              <a:t>August 25, 2021</a:t>
             </a:fld>
             <a:endParaRPr lang="en-US" dirty="0"/>
           </a:p>
@@ -5090,17 +5081,16 @@
           <a:p>
             <a:pPr lvl="0"/>
             <a:r>
-              <a:rPr lang="en-US" dirty="0" smtClean="0"/>
+              <a:rPr lang="en-US" dirty="0"/>
               <a:t>Presenter Name</a:t>
             </a:r>
             <a:br>
-              <a:rPr lang="en-US" dirty="0" smtClean="0"/>
+              <a:rPr lang="en-US" dirty="0"/>
             </a:br>
             <a:r>
-              <a:rPr lang="en-US" dirty="0" smtClean="0"/>
+              <a:rPr lang="en-US" dirty="0"/>
               <a:t>Presenter Title</a:t>
             </a:r>
-            <a:endParaRPr lang="en-US" dirty="0"/>
           </a:p>
         </p:txBody>
       </p:sp>
@@ -5117,13 +5107,6 @@
   <p:transition>
     <p:fade/>
   </p:transition>
-  <p:timing>
-    <p:tnLst>
-      <p:par>
-        <p:cTn id="1" dur="indefinite" restart="never" nodeType="tmRoot"/>
-      </p:par>
-    </p:tnLst>
-  </p:timing>
   <p:hf sldNum="0" hdr="0" ftr="0"/>
 </p:sldLayout>
 </file>
@@ -5416,7 +5399,7 @@
           <a:p>
             <a:fld id="{5958763E-B898-436D-883D-03711491D54A}" type="datetimeFigureOut">
               <a:rPr lang="en-US" smtClean="0"/>
-              <a:t>4/13/2020</a:t>
+              <a:t>8/25/2021</a:t>
             </a:fld>
             <a:endParaRPr lang="en-US"/>
           </a:p>
@@ -5489,13 +5472,6 @@
   <p:transition>
     <p:fade/>
   </p:transition>
-  <p:timing>
-    <p:tnLst>
-      <p:par>
-        <p:cTn id="1" dur="indefinite" restart="never" nodeType="tmRoot"/>
-      </p:par>
-    </p:tnLst>
-  </p:timing>
 </p:sldLayout>
 </file>
 
@@ -5544,10 +5520,9 @@
           </a:lstStyle>
           <a:p>
             <a:r>
-              <a:rPr lang="en-US" dirty="0" smtClean="0"/>
+              <a:rPr lang="en-US" dirty="0"/>
               <a:t>Click icon to add picture</a:t>
             </a:r>
-            <a:endParaRPr lang="en-US" dirty="0"/>
           </a:p>
         </p:txBody>
       </p:sp>
@@ -5617,7 +5592,7 @@
           <a:p>
             <a:fld id="{5958763E-B898-436D-883D-03711491D54A}" type="datetimeFigureOut">
               <a:rPr lang="en-US" smtClean="0"/>
-              <a:t>4/13/2020</a:t>
+              <a:t>8/25/2021</a:t>
             </a:fld>
             <a:endParaRPr lang="en-US"/>
           </a:p>
@@ -5690,13 +5665,6 @@
   <p:transition>
     <p:fade/>
   </p:transition>
-  <p:timing>
-    <p:tnLst>
-      <p:par>
-        <p:cTn id="1" dur="indefinite" restart="never" nodeType="tmRoot"/>
-      </p:par>
-    </p:tnLst>
-  </p:timing>
 </p:sldLayout>
 </file>
 
@@ -5874,7 +5842,7 @@
           <a:p>
             <a:fld id="{5958763E-B898-436D-883D-03711491D54A}" type="datetimeFigureOut">
               <a:rPr lang="en-US" smtClean="0"/>
-              <a:t>4/13/2020</a:t>
+              <a:t>8/25/2021</a:t>
             </a:fld>
             <a:endParaRPr lang="en-US"/>
           </a:p>
@@ -5947,13 +5915,6 @@
   <p:transition>
     <p:fade/>
   </p:transition>
-  <p:timing>
-    <p:tnLst>
-      <p:par>
-        <p:cTn id="1" dur="indefinite" restart="never" nodeType="tmRoot"/>
-      </p:par>
-    </p:tnLst>
-  </p:timing>
 </p:sldLayout>
 </file>
 
@@ -6229,7 +6190,7 @@
           <a:p>
             <a:fld id="{5958763E-B898-436D-883D-03711491D54A}" type="datetimeFigureOut">
               <a:rPr lang="en-US" smtClean="0"/>
-              <a:t>4/13/2020</a:t>
+              <a:t>8/25/2021</a:t>
             </a:fld>
             <a:endParaRPr lang="en-US"/>
           </a:p>
@@ -6290,13 +6251,6 @@
   <p:transition>
     <p:fade/>
   </p:transition>
-  <p:timing>
-    <p:tnLst>
-      <p:par>
-        <p:cTn id="1" dur="indefinite" restart="never" nodeType="tmRoot"/>
-      </p:par>
-    </p:tnLst>
-  </p:timing>
 </p:sldLayout>
 </file>
 
@@ -6652,7 +6606,7 @@
           <a:p>
             <a:fld id="{5958763E-B898-436D-883D-03711491D54A}" type="datetimeFigureOut">
               <a:rPr lang="en-US" smtClean="0"/>
-              <a:t>4/13/2020</a:t>
+              <a:t>8/25/2021</a:t>
             </a:fld>
             <a:endParaRPr lang="en-US"/>
           </a:p>
@@ -6713,13 +6667,6 @@
   <p:transition>
     <p:fade/>
   </p:transition>
-  <p:timing>
-    <p:tnLst>
-      <p:par>
-        <p:cTn id="1" dur="indefinite" restart="never" nodeType="tmRoot"/>
-      </p:par>
-    </p:tnLst>
-  </p:timing>
 </p:sldLayout>
 </file>
 
@@ -7160,7 +7107,7 @@
           <a:p>
             <a:fld id="{5958763E-B898-436D-883D-03711491D54A}" type="datetimeFigureOut">
               <a:rPr lang="en-US" smtClean="0"/>
-              <a:t>4/13/2020</a:t>
+              <a:t>8/25/2021</a:t>
             </a:fld>
             <a:endParaRPr lang="en-US"/>
           </a:p>
@@ -7221,13 +7168,6 @@
   <p:transition>
     <p:fade/>
   </p:transition>
-  <p:timing>
-    <p:tnLst>
-      <p:par>
-        <p:cTn id="1" dur="indefinite" restart="never" nodeType="tmRoot"/>
-      </p:par>
-    </p:tnLst>
-  </p:timing>
 </p:sldLayout>
 </file>
 
@@ -7618,7 +7558,7 @@
           <a:p>
             <a:fld id="{5958763E-B898-436D-883D-03711491D54A}" type="datetimeFigureOut">
               <a:rPr lang="en-US" smtClean="0"/>
-              <a:t>4/13/2020</a:t>
+              <a:t>8/25/2021</a:t>
             </a:fld>
             <a:endParaRPr lang="en-US"/>
           </a:p>
@@ -7679,13 +7619,6 @@
   <p:transition>
     <p:fade/>
   </p:transition>
-  <p:timing>
-    <p:tnLst>
-      <p:par>
-        <p:cTn id="1" dur="indefinite" restart="never" nodeType="tmRoot"/>
-      </p:par>
-    </p:tnLst>
-  </p:timing>
 </p:sldLayout>
 </file>
 
@@ -8236,7 +8169,7 @@
           <a:p>
             <a:fld id="{5958763E-B898-436D-883D-03711491D54A}" type="datetimeFigureOut">
               <a:rPr lang="en-US" smtClean="0"/>
-              <a:t>4/13/2020</a:t>
+              <a:t>8/25/2021</a:t>
             </a:fld>
             <a:endParaRPr lang="en-US"/>
           </a:p>
@@ -8297,13 +8230,6 @@
   <p:transition>
     <p:fade/>
   </p:transition>
-  <p:timing>
-    <p:tnLst>
-      <p:par>
-        <p:cTn id="1" dur="indefinite" restart="never" nodeType="tmRoot"/>
-      </p:par>
-    </p:tnLst>
-  </p:timing>
 </p:sldLayout>
 </file>
 
@@ -9014,7 +8940,7 @@
           <a:p>
             <a:fld id="{5958763E-B898-436D-883D-03711491D54A}" type="datetimeFigureOut">
               <a:rPr lang="en-US" smtClean="0"/>
-              <a:t>4/13/2020</a:t>
+              <a:t>8/25/2021</a:t>
             </a:fld>
             <a:endParaRPr lang="en-US"/>
           </a:p>
@@ -9075,13 +9001,6 @@
   <p:transition>
     <p:fade/>
   </p:transition>
-  <p:timing>
-    <p:tnLst>
-      <p:par>
-        <p:cTn id="1" dur="indefinite" restart="never" nodeType="tmRoot"/>
-      </p:par>
-    </p:tnLst>
-  </p:timing>
 </p:sldLayout>
 </file>
 
@@ -9125,7 +9044,7 @@
           <a:p>
             <a:fld id="{5958763E-B898-436D-883D-03711491D54A}" type="datetimeFigureOut">
               <a:rPr lang="en-US" smtClean="0"/>
-              <a:t>4/13/2020</a:t>
+              <a:t>8/25/2021</a:t>
             </a:fld>
             <a:endParaRPr lang="en-US"/>
           </a:p>
@@ -9198,13 +9117,6 @@
   <p:transition>
     <p:fade/>
   </p:transition>
-  <p:timing>
-    <p:tnLst>
-      <p:par>
-        <p:cTn id="1" dur="indefinite" restart="never" nodeType="tmRoot"/>
-      </p:par>
-    </p:tnLst>
-  </p:timing>
 </p:sldLayout>
 </file>
 
@@ -9284,7 +9196,7 @@
                 <a:spcPct val="0"/>
               </a:spcAft>
             </a:pPr>
-            <a:endParaRPr lang="en-US" sz="2400" dirty="0" err="1" smtClean="0">
+            <a:endParaRPr lang="en-US" sz="2400" dirty="0" err="1">
               <a:gradFill>
                 <a:gsLst>
                   <a:gs pos="0">
@@ -9417,15 +9329,7 @@
           <a:p>
             <a:r>
               <a:rPr lang="en-US" dirty="0"/>
-              <a:t>Click to edit Master </a:t>
-            </a:r>
-            <a:r>
-              <a:rPr lang="en-US" dirty="0" smtClean="0"/>
-              <a:t>subtitle </a:t>
-            </a:r>
-            <a:r>
-              <a:rPr lang="en-US" dirty="0"/>
-              <a:t>style</a:t>
+              <a:t>Click to edit Master subtitle style</a:t>
             </a:r>
           </a:p>
         </p:txBody>
@@ -9467,7 +9371,7 @@
             <a:fld id="{1C2D31DE-C454-491C-B5C3-F097855E3DF7}" type="datetime4">
               <a:rPr lang="en-US" smtClean="0"/>
               <a:pPr/>
-              <a:t>April 13, 2020</a:t>
+              <a:t>August 25, 2021</a:t>
             </a:fld>
             <a:endParaRPr lang="en-US" dirty="0"/>
           </a:p>
@@ -12541,17 +12445,16 @@
           <a:p>
             <a:pPr lvl="0"/>
             <a:r>
-              <a:rPr lang="en-US" dirty="0" smtClean="0"/>
+              <a:rPr lang="en-US" dirty="0"/>
               <a:t>Presenter Name</a:t>
             </a:r>
             <a:br>
-              <a:rPr lang="en-US" dirty="0" smtClean="0"/>
+              <a:rPr lang="en-US" dirty="0"/>
             </a:br>
             <a:r>
-              <a:rPr lang="en-US" dirty="0" smtClean="0"/>
+              <a:rPr lang="en-US" dirty="0"/>
               <a:t>Presenter Title</a:t>
             </a:r>
-            <a:endParaRPr lang="en-US" dirty="0"/>
           </a:p>
         </p:txBody>
       </p:sp>
@@ -12568,13 +12471,6 @@
   <p:transition>
     <p:fade/>
   </p:transition>
-  <p:timing>
-    <p:tnLst>
-      <p:par>
-        <p:cTn id="1" dur="indefinite" restart="never" nodeType="tmRoot"/>
-      </p:par>
-    </p:tnLst>
-  </p:timing>
   <p:hf sldNum="0" hdr="0" ftr="0"/>
 </p:sldLayout>
 </file>
@@ -12627,7 +12523,7 @@
           <a:p>
             <a:fld id="{5958763E-B898-436D-883D-03711491D54A}" type="datetimeFigureOut">
               <a:rPr lang="en-US" smtClean="0"/>
-              <a:t>4/13/2020</a:t>
+              <a:t>8/25/2021</a:t>
             </a:fld>
             <a:endParaRPr lang="en-US"/>
           </a:p>
@@ -12700,13 +12596,6 @@
   <p:transition>
     <p:fade/>
   </p:transition>
-  <p:timing>
-    <p:tnLst>
-      <p:par>
-        <p:cTn id="1" dur="indefinite" restart="never" nodeType="tmRoot"/>
-      </p:par>
-    </p:tnLst>
-  </p:timing>
 </p:sldLayout>
 </file>
 
@@ -12758,7 +12647,7 @@
           <a:p>
             <a:fld id="{5958763E-B898-436D-883D-03711491D54A}" type="datetimeFigureOut">
               <a:rPr lang="en-US" smtClean="0"/>
-              <a:t>4/13/2020</a:t>
+              <a:t>8/25/2021</a:t>
             </a:fld>
             <a:endParaRPr lang="en-US"/>
           </a:p>
@@ -12831,13 +12720,6 @@
   <p:transition>
     <p:fade/>
   </p:transition>
-  <p:timing>
-    <p:tnLst>
-      <p:par>
-        <p:cTn id="1" dur="indefinite" restart="never" nodeType="tmRoot"/>
-      </p:par>
-    </p:tnLst>
-  </p:timing>
 </p:sldLayout>
 </file>
 
@@ -12889,7 +12771,7 @@
           <a:p>
             <a:fld id="{5958763E-B898-436D-883D-03711491D54A}" type="datetimeFigureOut">
               <a:rPr lang="en-US" smtClean="0"/>
-              <a:t>4/13/2020</a:t>
+              <a:t>8/25/2021</a:t>
             </a:fld>
             <a:endParaRPr lang="en-US"/>
           </a:p>
@@ -12962,13 +12844,6 @@
   <p:transition>
     <p:fade/>
   </p:transition>
-  <p:timing>
-    <p:tnLst>
-      <p:par>
-        <p:cTn id="1" dur="indefinite" restart="never" nodeType="tmRoot"/>
-      </p:par>
-    </p:tnLst>
-  </p:timing>
 </p:sldLayout>
 </file>
 
@@ -13020,7 +12895,7 @@
           <a:p>
             <a:fld id="{5958763E-B898-436D-883D-03711491D54A}" type="datetimeFigureOut">
               <a:rPr lang="en-US" smtClean="0"/>
-              <a:t>4/13/2020</a:t>
+              <a:t>8/25/2021</a:t>
             </a:fld>
             <a:endParaRPr lang="en-US"/>
           </a:p>
@@ -13093,13 +12968,6 @@
   <p:transition>
     <p:fade/>
   </p:transition>
-  <p:timing>
-    <p:tnLst>
-      <p:par>
-        <p:cTn id="1" dur="indefinite" restart="never" nodeType="tmRoot"/>
-      </p:par>
-    </p:tnLst>
-  </p:timing>
 </p:sldLayout>
 </file>
 
@@ -13151,7 +13019,7 @@
           <a:p>
             <a:fld id="{5958763E-B898-436D-883D-03711491D54A}" type="datetimeFigureOut">
               <a:rPr lang="en-US" smtClean="0"/>
-              <a:t>4/13/2020</a:t>
+              <a:t>8/25/2021</a:t>
             </a:fld>
             <a:endParaRPr lang="en-US"/>
           </a:p>
@@ -13224,13 +13092,6 @@
   <p:transition>
     <p:fade/>
   </p:transition>
-  <p:timing>
-    <p:tnLst>
-      <p:par>
-        <p:cTn id="1" dur="indefinite" restart="never" nodeType="tmRoot"/>
-      </p:par>
-    </p:tnLst>
-  </p:timing>
 </p:sldLayout>
 </file>
 
@@ -13282,7 +13143,7 @@
           <a:p>
             <a:fld id="{5958763E-B898-436D-883D-03711491D54A}" type="datetimeFigureOut">
               <a:rPr lang="en-US" smtClean="0"/>
-              <a:t>4/13/2020</a:t>
+              <a:t>8/25/2021</a:t>
             </a:fld>
             <a:endParaRPr lang="en-US"/>
           </a:p>
@@ -13355,13 +13216,6 @@
   <p:transition>
     <p:fade/>
   </p:transition>
-  <p:timing>
-    <p:tnLst>
-      <p:par>
-        <p:cTn id="1" dur="indefinite" restart="never" nodeType="tmRoot"/>
-      </p:par>
-    </p:tnLst>
-  </p:timing>
 </p:sldLayout>
 </file>
 
@@ -13413,7 +13267,7 @@
           <a:p>
             <a:fld id="{5958763E-B898-436D-883D-03711491D54A}" type="datetimeFigureOut">
               <a:rPr lang="en-US" smtClean="0"/>
-              <a:t>4/13/2020</a:t>
+              <a:t>8/25/2021</a:t>
             </a:fld>
             <a:endParaRPr lang="en-US"/>
           </a:p>
@@ -13486,13 +13340,6 @@
   <p:transition>
     <p:fade/>
   </p:transition>
-  <p:timing>
-    <p:tnLst>
-      <p:par>
-        <p:cTn id="1" dur="indefinite" restart="never" nodeType="tmRoot"/>
-      </p:par>
-    </p:tnLst>
-  </p:timing>
 </p:sldLayout>
 </file>
 
@@ -13544,7 +13391,7 @@
           <a:p>
             <a:fld id="{5958763E-B898-436D-883D-03711491D54A}" type="datetimeFigureOut">
               <a:rPr lang="en-US" smtClean="0"/>
-              <a:t>4/13/2020</a:t>
+              <a:t>8/25/2021</a:t>
             </a:fld>
             <a:endParaRPr lang="en-US"/>
           </a:p>
@@ -13617,13 +13464,6 @@
   <p:transition>
     <p:fade/>
   </p:transition>
-  <p:timing>
-    <p:tnLst>
-      <p:par>
-        <p:cTn id="1" dur="indefinite" restart="never" nodeType="tmRoot"/>
-      </p:par>
-    </p:tnLst>
-  </p:timing>
 </p:sldLayout>
 </file>
 
@@ -13684,7 +13524,7 @@
           <a:p>
             <a:fld id="{5958763E-B898-436D-883D-03711491D54A}" type="datetimeFigureOut">
               <a:rPr lang="en-US" smtClean="0"/>
-              <a:t>4/13/2020</a:t>
+              <a:t>8/25/2021</a:t>
             </a:fld>
             <a:endParaRPr lang="en-US"/>
           </a:p>
@@ -13757,13 +13597,6 @@
   <p:transition>
     <p:fade/>
   </p:transition>
-  <p:timing>
-    <p:tnLst>
-      <p:par>
-        <p:cTn id="1" dur="indefinite" restart="never" nodeType="tmRoot"/>
-      </p:par>
-    </p:tnLst>
-  </p:timing>
 </p:sldLayout>
 </file>
 
@@ -16765,13 +16598,6 @@
   <p:transition>
     <p:fade/>
   </p:transition>
-  <p:timing>
-    <p:tnLst>
-      <p:par>
-        <p:cTn id="1" dur="indefinite" restart="never" nodeType="tmRoot"/>
-      </p:par>
-    </p:tnLst>
-  </p:timing>
 </p:sldLayout>
 </file>
 
@@ -16859,7 +16685,7 @@
                 <a:spcPct val="0"/>
               </a:spcAft>
             </a:pPr>
-            <a:endParaRPr lang="en-US" sz="2400" dirty="0" err="1" smtClean="0">
+            <a:endParaRPr lang="en-US" sz="2400" dirty="0" err="1">
               <a:gradFill>
                 <a:gsLst>
                   <a:gs pos="0">
@@ -16995,15 +16821,7 @@
           <a:p>
             <a:r>
               <a:rPr lang="en-US" dirty="0"/>
-              <a:t>Click to edit Master </a:t>
-            </a:r>
-            <a:r>
-              <a:rPr lang="en-US" dirty="0" smtClean="0"/>
-              <a:t>subtitle </a:t>
-            </a:r>
-            <a:r>
-              <a:rPr lang="en-US" dirty="0"/>
-              <a:t>style</a:t>
+              <a:t>Click to edit Master subtitle style</a:t>
             </a:r>
           </a:p>
         </p:txBody>
@@ -17045,7 +16863,7 @@
             <a:fld id="{1C2D31DE-C454-491C-B5C3-F097855E3DF7}" type="datetime4">
               <a:rPr lang="en-US" smtClean="0"/>
               <a:pPr/>
-              <a:t>April 13, 2020</a:t>
+              <a:t>August 25, 2021</a:t>
             </a:fld>
             <a:endParaRPr lang="en-US" dirty="0"/>
           </a:p>
@@ -20127,17 +19945,16 @@
           <a:p>
             <a:pPr lvl="0"/>
             <a:r>
-              <a:rPr lang="en-US" dirty="0" smtClean="0"/>
+              <a:rPr lang="en-US" dirty="0"/>
               <a:t>Presenter Name</a:t>
             </a:r>
             <a:br>
-              <a:rPr lang="en-US" dirty="0" smtClean="0"/>
+              <a:rPr lang="en-US" dirty="0"/>
             </a:br>
             <a:r>
-              <a:rPr lang="en-US" dirty="0" smtClean="0"/>
+              <a:rPr lang="en-US" dirty="0"/>
               <a:t>Presenter Title</a:t>
             </a:r>
-            <a:endParaRPr lang="en-US" dirty="0"/>
           </a:p>
         </p:txBody>
       </p:sp>
@@ -20154,13 +19971,6 @@
   <p:transition>
     <p:fade/>
   </p:transition>
-  <p:timing>
-    <p:tnLst>
-      <p:par>
-        <p:cTn id="1" dur="indefinite" restart="never" nodeType="tmRoot"/>
-      </p:par>
-    </p:tnLst>
-  </p:timing>
   <p:hf sldNum="0" hdr="0" ftr="0"/>
 </p:sldLayout>
 </file>
@@ -27670,10 +27480,9 @@
           <a:p>
             <a:pPr lvl="0"/>
             <a:r>
-              <a:rPr lang="en-US" dirty="0" smtClean="0"/>
+              <a:rPr lang="en-US" dirty="0"/>
               <a:t>&lt;Call to action&gt;</a:t>
             </a:r>
-            <a:endParaRPr lang="en-US" dirty="0"/>
           </a:p>
         </p:txBody>
       </p:sp>
@@ -29290,7 +29099,7 @@
           <a:p>
             <a:fld id="{5958763E-B898-436D-883D-03711491D54A}" type="datetimeFigureOut">
               <a:rPr lang="en-US" smtClean="0"/>
-              <a:t>4/13/2020</a:t>
+              <a:t>8/25/2021</a:t>
             </a:fld>
             <a:endParaRPr lang="en-US"/>
           </a:p>
@@ -29417,7 +29226,7 @@
                 <a:spcPct val="0"/>
               </a:spcAft>
             </a:pPr>
-            <a:endParaRPr lang="en-US" sz="2400" dirty="0" err="1" smtClean="0">
+            <a:endParaRPr lang="en-US" sz="2400" dirty="0" err="1">
               <a:gradFill>
                 <a:gsLst>
                   <a:gs pos="0">
@@ -29448,13 +29257,6 @@
   <p:transition>
     <p:fade/>
   </p:transition>
-  <p:timing>
-    <p:tnLst>
-      <p:par>
-        <p:cTn id="1" dur="indefinite" restart="never" nodeType="tmRoot"/>
-      </p:par>
-    </p:tnLst>
-  </p:timing>
 </p:sldLayout>
 </file>
 
@@ -29699,7 +29501,7 @@
           <a:p>
             <a:fld id="{5958763E-B898-436D-883D-03711491D54A}" type="datetimeFigureOut">
               <a:rPr lang="en-US" smtClean="0"/>
-              <a:t>4/13/2020</a:t>
+              <a:t>8/25/2021</a:t>
             </a:fld>
             <a:endParaRPr lang="en-US"/>
           </a:p>
@@ -29772,13 +29574,6 @@
   <p:transition>
     <p:fade/>
   </p:transition>
-  <p:timing>
-    <p:tnLst>
-      <p:par>
-        <p:cTn id="1" dur="indefinite" restart="never" nodeType="tmRoot"/>
-      </p:par>
-    </p:tnLst>
-  </p:timing>
 </p:sldLayout>
 </file>
 
@@ -30000,7 +29795,7 @@
           <a:p>
             <a:fld id="{5958763E-B898-436D-883D-03711491D54A}" type="datetimeFigureOut">
               <a:rPr lang="en-US" smtClean="0"/>
-              <a:t>4/13/2020</a:t>
+              <a:t>8/25/2021</a:t>
             </a:fld>
             <a:endParaRPr lang="en-US"/>
           </a:p>
@@ -30073,13 +29868,6 @@
   <p:transition>
     <p:fade/>
   </p:transition>
-  <p:timing>
-    <p:tnLst>
-      <p:par>
-        <p:cTn id="1" dur="indefinite" restart="never" nodeType="tmRoot"/>
-      </p:par>
-    </p:tnLst>
-  </p:timing>
 </p:sldLayout>
 </file>
 
@@ -30208,7 +29996,7 @@
           <a:p>
             <a:fld id="{5958763E-B898-436D-883D-03711491D54A}" type="datetimeFigureOut">
               <a:rPr lang="en-US" smtClean="0"/>
-              <a:t>4/13/2020</a:t>
+              <a:t>8/25/2021</a:t>
             </a:fld>
             <a:endParaRPr lang="en-US"/>
           </a:p>
@@ -30331,13 +30119,6 @@
   <p:transition>
     <p:fade/>
   </p:transition>
-  <p:timing>
-    <p:tnLst>
-      <p:par>
-        <p:cTn id="1" dur="indefinite" restart="never" nodeType="tmRoot"/>
-      </p:par>
-    </p:tnLst>
-  </p:timing>
 </p:sldLayout>
 </file>
 
@@ -30476,7 +30257,7 @@
           <a:p>
             <a:fld id="{5958763E-B898-436D-883D-03711491D54A}" type="datetimeFigureOut">
               <a:rPr lang="en-US" smtClean="0"/>
-              <a:t>4/13/2020</a:t>
+              <a:t>8/25/2021</a:t>
             </a:fld>
             <a:endParaRPr lang="en-US"/>
           </a:p>
@@ -30603,13 +30384,6 @@
   <p:transition>
     <p:fade/>
   </p:transition>
-  <p:timing>
-    <p:tnLst>
-      <p:par>
-        <p:cTn id="1" dur="indefinite" restart="never" nodeType="tmRoot"/>
-      </p:par>
-    </p:tnLst>
-  </p:timing>
 </p:sldLayout>
 </file>
 
@@ -30771,7 +30545,7 @@
                 <a:spcPct val="0"/>
               </a:spcAft>
             </a:pPr>
-            <a:endParaRPr lang="en-US" sz="2400" dirty="0" err="1" smtClean="0">
+            <a:endParaRPr lang="en-US" sz="2400" dirty="0" err="1">
               <a:gradFill>
                 <a:gsLst>
                   <a:gs pos="0">
@@ -30822,10 +30596,9 @@
           </a:lstStyle>
           <a:p>
             <a:r>
-              <a:rPr lang="en-US" dirty="0" smtClean="0"/>
+              <a:rPr lang="en-US" dirty="0"/>
               <a:t>Type “Agenda”</a:t>
             </a:r>
-            <a:endParaRPr lang="en-US" dirty="0"/>
           </a:p>
         </p:txBody>
       </p:sp>
@@ -30949,24 +30722,23 @@
           <a:p>
             <a:pPr lvl="0"/>
             <a:r>
-              <a:rPr lang="en-US" dirty="0" smtClean="0"/>
+              <a:rPr lang="en-US" dirty="0"/>
               <a:t>Item 1</a:t>
             </a:r>
           </a:p>
           <a:p>
             <a:pPr lvl="0"/>
             <a:r>
-              <a:rPr lang="en-US" dirty="0" smtClean="0"/>
+              <a:rPr lang="en-US" dirty="0"/>
               <a:t>Item 2</a:t>
             </a:r>
           </a:p>
           <a:p>
             <a:pPr lvl="0"/>
             <a:r>
-              <a:rPr lang="en-US" dirty="0" smtClean="0"/>
+              <a:rPr lang="en-US" dirty="0"/>
               <a:t>Item 3</a:t>
             </a:r>
-            <a:endParaRPr lang="en-US" dirty="0"/>
           </a:p>
         </p:txBody>
       </p:sp>
@@ -30993,7 +30765,7 @@
           <a:p>
             <a:fld id="{5958763E-B898-436D-883D-03711491D54A}" type="datetimeFigureOut">
               <a:rPr lang="en-US" smtClean="0"/>
-              <a:t>4/13/2020</a:t>
+              <a:t>8/25/2021</a:t>
             </a:fld>
             <a:endParaRPr lang="en-US"/>
           </a:p>
@@ -31100,13 +30872,6 @@
   <p:transition>
     <p:fade/>
   </p:transition>
-  <p:timing>
-    <p:tnLst>
-      <p:par>
-        <p:cTn id="1" dur="indefinite" restart="never" nodeType="tmRoot"/>
-      </p:par>
-    </p:tnLst>
-  </p:timing>
 </p:sldLayout>
 </file>
 
@@ -31268,7 +31033,7 @@
                 <a:spcPct val="0"/>
               </a:spcAft>
             </a:pPr>
-            <a:endParaRPr lang="en-US" sz="2400" dirty="0" err="1" smtClean="0">
+            <a:endParaRPr lang="en-US" sz="2400" dirty="0" err="1">
               <a:gradFill>
                 <a:gsLst>
                   <a:gs pos="0">
@@ -31321,10 +31086,9 @@
           </a:lstStyle>
           <a:p>
             <a:r>
-              <a:rPr lang="en-US" dirty="0" smtClean="0"/>
+              <a:rPr lang="en-US" dirty="0"/>
               <a:t>Notable Quote</a:t>
             </a:r>
-            <a:endParaRPr lang="en-US" dirty="0"/>
           </a:p>
         </p:txBody>
       </p:sp>
@@ -31451,10 +31215,9 @@
           <a:p>
             <a:pPr lvl="0"/>
             <a:r>
-              <a:rPr lang="en-US" dirty="0" smtClean="0"/>
+              <a:rPr lang="en-US" dirty="0"/>
               <a:t>– Attribution</a:t>
             </a:r>
-            <a:endParaRPr lang="en-US" dirty="0"/>
           </a:p>
         </p:txBody>
       </p:sp>
@@ -31481,7 +31244,7 @@
           <a:p>
             <a:fld id="{5958763E-B898-436D-883D-03711491D54A}" type="datetimeFigureOut">
               <a:rPr lang="en-US" smtClean="0"/>
-              <a:t>4/13/2020</a:t>
+              <a:t>8/25/2021</a:t>
             </a:fld>
             <a:endParaRPr lang="en-US"/>
           </a:p>
@@ -32229,13 +31992,6 @@
   <p:transition>
     <p:fade/>
   </p:transition>
-  <p:timing>
-    <p:tnLst>
-      <p:par>
-        <p:cTn id="1" dur="indefinite" restart="never" nodeType="tmRoot"/>
-      </p:par>
-    </p:tnLst>
-  </p:timing>
 </p:sldLayout>
 </file>
 
@@ -32307,7 +32063,7 @@
           <a:p>
             <a:fld id="{5958763E-B898-436D-883D-03711491D54A}" type="datetimeFigureOut">
               <a:rPr lang="en-US" smtClean="0"/>
-              <a:t>4/13/2020</a:t>
+              <a:t>8/25/2021</a:t>
             </a:fld>
             <a:endParaRPr lang="en-US"/>
           </a:p>
@@ -32380,13 +32136,6 @@
   <p:transition>
     <p:fade/>
   </p:transition>
-  <p:timing>
-    <p:tnLst>
-      <p:par>
-        <p:cTn id="1" dur="indefinite" restart="never" nodeType="tmRoot"/>
-      </p:par>
-    </p:tnLst>
-  </p:timing>
 </p:sldLayout>
 </file>
 
@@ -32515,7 +32264,7 @@
           <a:p>
             <a:fld id="{5958763E-B898-436D-883D-03711491D54A}" type="datetimeFigureOut">
               <a:rPr lang="en-US" smtClean="0"/>
-              <a:t>4/13/2020</a:t>
+              <a:t>8/25/2021</a:t>
             </a:fld>
             <a:endParaRPr lang="en-US"/>
           </a:p>
@@ -32638,13 +32387,6 @@
   <p:transition>
     <p:fade/>
   </p:transition>
-  <p:timing>
-    <p:tnLst>
-      <p:par>
-        <p:cTn id="1" dur="indefinite" restart="never" nodeType="tmRoot"/>
-      </p:par>
-    </p:tnLst>
-  </p:timing>
 </p:sldLayout>
 </file>
 
@@ -32857,7 +32599,7 @@
           <a:p>
             <a:fld id="{5958763E-B898-436D-883D-03711491D54A}" type="datetimeFigureOut">
               <a:rPr lang="en-US" smtClean="0"/>
-              <a:t>4/13/2020</a:t>
+              <a:t>8/25/2021</a:t>
             </a:fld>
             <a:endParaRPr lang="en-US"/>
           </a:p>
@@ -32930,13 +32672,6 @@
   <p:transition>
     <p:fade/>
   </p:transition>
-  <p:timing>
-    <p:tnLst>
-      <p:par>
-        <p:cTn id="1" dur="indefinite" restart="never" nodeType="tmRoot"/>
-      </p:par>
-    </p:tnLst>
-  </p:timing>
 </p:sldLayout>
 </file>
 
@@ -33094,7 +32829,7 @@
           <a:p>
             <a:fld id="{5958763E-B898-436D-883D-03711491D54A}" type="datetimeFigureOut">
               <a:rPr lang="en-US" smtClean="0"/>
-              <a:t>4/13/2020</a:t>
+              <a:t>8/25/2021</a:t>
             </a:fld>
             <a:endParaRPr lang="en-US"/>
           </a:p>
@@ -33167,13 +32902,6 @@
   <p:transition>
     <p:fade/>
   </p:transition>
-  <p:timing>
-    <p:tnLst>
-      <p:par>
-        <p:cTn id="1" dur="indefinite" restart="never" nodeType="tmRoot"/>
-      </p:par>
-    </p:tnLst>
-  </p:timing>
 </p:sldLayout>
 </file>
 
@@ -33345,7 +33073,7 @@
           <a:p>
             <a:fld id="{5958763E-B898-436D-883D-03711491D54A}" type="datetimeFigureOut">
               <a:rPr lang="en-US" smtClean="0"/>
-              <a:t>4/13/2020</a:t>
+              <a:t>8/25/2021</a:t>
             </a:fld>
             <a:endParaRPr lang="en-US"/>
           </a:p>
@@ -33491,13 +33219,6 @@
   <p:transition>
     <p:fade/>
   </p:transition>
-  <p:timing>
-    <p:tnLst>
-      <p:par>
-        <p:cTn id="1" dur="indefinite" restart="never" nodeType="tmRoot"/>
-      </p:par>
-    </p:tnLst>
-  </p:timing>
   <p:txStyles>
     <p:titleStyle>
       <a:lvl1pPr algn="l" defTabSz="914400" rtl="0" eaLnBrk="1" latinLnBrk="0" hangingPunct="1">
@@ -33802,7 +33523,7 @@
       </a:lvl9pPr>
     </p:otherStyle>
   </p:txStyles>
-  <p:extLst mod="1">
+  <p:extLst>
     <p:ext uri="{27BBF7A9-308A-43DC-89C8-2F10F3537804}">
       <p15:sldGuideLst xmlns:p15="http://schemas.microsoft.com/office/powerpoint/2012/main">
         <p15:guide id="1" orient="horz" pos="2160" userDrawn="1">
@@ -33881,10 +33602,9 @@
           <a:lstStyle/>
           <a:p>
             <a:r>
-              <a:rPr lang="en-US" sz="6600" dirty="0" smtClean="0"/>
+              <a:rPr lang="en-US" sz="6600" dirty="0"/>
               <a:t>JavaScript Objects</a:t>
             </a:r>
-            <a:endParaRPr lang="en-US" sz="6600" dirty="0"/>
           </a:p>
         </p:txBody>
       </p:sp>
@@ -33909,11 +33629,11 @@
           <a:lstStyle/>
           <a:p>
             <a:r>
-              <a:rPr lang="en-US" dirty="0" smtClean="0"/>
+              <a:rPr lang="en-US" dirty="0"/>
               <a:t>Hy-Tech Club: </a:t>
             </a:r>
             <a:r>
-              <a:rPr lang="en-US" smtClean="0"/>
+              <a:rPr lang="en-US"/>
               <a:t>Web 102</a:t>
             </a:r>
             <a:endParaRPr lang="en-US" dirty="0"/>
@@ -36901,13 +36621,6 @@
   <p:transition>
     <p:fade/>
   </p:transition>
-  <p:timing>
-    <p:tnLst>
-      <p:par>
-        <p:cTn id="1" dur="indefinite" restart="never" nodeType="tmRoot"/>
-      </p:par>
-    </p:tnLst>
-  </p:timing>
 </p:sld>
 </file>
 
@@ -36944,10 +36657,9 @@
           <a:lstStyle/>
           <a:p>
             <a:r>
-              <a:rPr lang="en-US" dirty="0" smtClean="0"/>
+              <a:rPr lang="en-US" dirty="0"/>
               <a:t>Mini-quiz</a:t>
             </a:r>
-            <a:endParaRPr lang="en-US" dirty="0"/>
           </a:p>
         </p:txBody>
       </p:sp>
@@ -37197,7 +36909,7 @@
               <a:buNone/>
             </a:pPr>
             <a:r>
-              <a:rPr lang="en-US" sz="3600" dirty="0" smtClean="0">
+              <a:rPr lang="en-US" sz="3600" dirty="0">
                 <a:solidFill>
                   <a:srgbClr val="000000"/>
                 </a:solidFill>
@@ -37205,12 +36917,6 @@
               </a:rPr>
               <a:t>}</a:t>
             </a:r>
-            <a:endParaRPr lang="en-US" sz="3600" dirty="0">
-              <a:solidFill>
-                <a:srgbClr val="000000"/>
-              </a:solidFill>
-              <a:latin typeface="Consolas" panose="020B0609020204030204" pitchFamily="49" charset="0"/>
-            </a:endParaRPr>
           </a:p>
         </p:txBody>
       </p:sp>
@@ -37245,7 +36951,7 @@
               </a:buClr>
             </a:pPr>
             <a:r>
-              <a:rPr lang="en-US" sz="4400" dirty="0" err="1" smtClean="0">
+              <a:rPr lang="en-US" sz="4400" dirty="0" err="1">
                 <a:solidFill>
                   <a:schemeClr val="accent5">
                     <a:lumMod val="10000"/>
@@ -37320,13 +37026,6 @@
   <p:transition>
     <p:fade/>
   </p:transition>
-  <p:timing>
-    <p:tnLst>
-      <p:par>
-        <p:cTn id="1" dur="indefinite" restart="never" nodeType="tmRoot"/>
-      </p:par>
-    </p:tnLst>
-  </p:timing>
 </p:sld>
 </file>
 
@@ -37363,10 +37062,9 @@
           <a:lstStyle/>
           <a:p>
             <a:r>
-              <a:rPr lang="en-US" dirty="0" smtClean="0"/>
+              <a:rPr lang="en-US" dirty="0"/>
               <a:t>Mini-quiz</a:t>
             </a:r>
-            <a:endParaRPr lang="en-US" dirty="0"/>
           </a:p>
         </p:txBody>
       </p:sp>
@@ -37616,7 +37314,7 @@
               <a:buNone/>
             </a:pPr>
             <a:r>
-              <a:rPr lang="en-US" sz="3600" dirty="0" smtClean="0">
+              <a:rPr lang="en-US" sz="3600" dirty="0">
                 <a:solidFill>
                   <a:srgbClr val="000000"/>
                 </a:solidFill>
@@ -37624,12 +37322,6 @@
               </a:rPr>
               <a:t>}</a:t>
             </a:r>
-            <a:endParaRPr lang="en-US" sz="3600" dirty="0">
-              <a:solidFill>
-                <a:srgbClr val="000000"/>
-              </a:solidFill>
-              <a:latin typeface="Consolas" panose="020B0609020204030204" pitchFamily="49" charset="0"/>
-            </a:endParaRPr>
           </a:p>
         </p:txBody>
       </p:sp>
@@ -37672,7 +37364,7 @@
               <a:t>How would you </a:t>
             </a:r>
             <a:r>
-              <a:rPr lang="en-US" sz="2800" i="1" dirty="0" smtClean="0">
+              <a:rPr lang="en-US" sz="2800" i="1" dirty="0">
                 <a:solidFill>
                   <a:srgbClr val="56565A"/>
                 </a:solidFill>
@@ -37680,34 +37372,13 @@
               <a:t>set</a:t>
             </a:r>
             <a:r>
-              <a:rPr lang="en-US" sz="2800" dirty="0" smtClean="0">
-                <a:solidFill>
-                  <a:srgbClr val="56565A"/>
-                </a:solidFill>
-              </a:rPr>
-              <a:t> </a:t>
-            </a:r>
-            <a:r>
               <a:rPr lang="en-US" sz="2800" dirty="0">
                 <a:solidFill>
                   <a:srgbClr val="56565A"/>
                 </a:solidFill>
               </a:rPr>
-              <a:t>the </a:t>
-            </a:r>
-            <a:r>
-              <a:rPr lang="en-US" sz="2800" dirty="0" smtClean="0">
-                <a:solidFill>
-                  <a:srgbClr val="56565A"/>
-                </a:solidFill>
-              </a:rPr>
-              <a:t>flight time to 250?</a:t>
-            </a:r>
-            <a:endParaRPr lang="en-US" sz="2800" dirty="0">
-              <a:solidFill>
-                <a:srgbClr val="56565A"/>
-              </a:solidFill>
-            </a:endParaRPr>
+              <a:t> the flight time to 250?</a:t>
+            </a:r>
           </a:p>
         </p:txBody>
       </p:sp>
@@ -37765,13 +37436,6 @@
   <p:transition>
     <p:fade/>
   </p:transition>
-  <p:timing>
-    <p:tnLst>
-      <p:par>
-        <p:cTn id="1" dur="indefinite" restart="never" nodeType="tmRoot"/>
-      </p:par>
-    </p:tnLst>
-  </p:timing>
 </p:sld>
 </file>
 
@@ -37808,10 +37472,9 @@
           <a:lstStyle/>
           <a:p>
             <a:r>
-              <a:rPr lang="en-US" dirty="0" smtClean="0"/>
+              <a:rPr lang="en-US" dirty="0"/>
               <a:t>Mini-quiz</a:t>
             </a:r>
-            <a:endParaRPr lang="en-US" dirty="0"/>
           </a:p>
         </p:txBody>
       </p:sp>
@@ -38061,7 +37724,7 @@
               <a:buNone/>
             </a:pPr>
             <a:r>
-              <a:rPr lang="en-US" sz="3600" dirty="0" smtClean="0">
+              <a:rPr lang="en-US" sz="3600" dirty="0">
                 <a:solidFill>
                   <a:srgbClr val="000000"/>
                 </a:solidFill>
@@ -38069,12 +37732,6 @@
               </a:rPr>
               <a:t>}</a:t>
             </a:r>
-            <a:endParaRPr lang="en-US" sz="3600" dirty="0">
-              <a:solidFill>
-                <a:srgbClr val="000000"/>
-              </a:solidFill>
-              <a:latin typeface="Consolas" panose="020B0609020204030204" pitchFamily="49" charset="0"/>
-            </a:endParaRPr>
           </a:p>
         </p:txBody>
       </p:sp>
@@ -38109,7 +37766,7 @@
               </a:buClr>
             </a:pPr>
             <a:r>
-              <a:rPr lang="en-US" sz="4400" dirty="0" err="1" smtClean="0">
+              <a:rPr lang="en-US" sz="4400" dirty="0" err="1">
                 <a:solidFill>
                   <a:schemeClr val="accent5">
                     <a:lumMod val="10000"/>
@@ -38120,7 +37777,7 @@
               <a:t>flight.FlightTime</a:t>
             </a:r>
             <a:r>
-              <a:rPr lang="en-US" sz="4400" dirty="0" smtClean="0">
+              <a:rPr lang="en-US" sz="4400" dirty="0">
                 <a:solidFill>
                   <a:schemeClr val="accent5">
                     <a:lumMod val="10000"/>
@@ -38131,7 +37788,7 @@
               <a:t> = </a:t>
             </a:r>
             <a:r>
-              <a:rPr lang="en-US" sz="4400" dirty="0" smtClean="0">
+              <a:rPr lang="en-US" sz="4400" dirty="0">
                 <a:solidFill>
                   <a:srgbClr val="09885A"/>
                 </a:solidFill>
@@ -38204,13 +37861,6 @@
   <p:transition>
     <p:fade/>
   </p:transition>
-  <p:timing>
-    <p:tnLst>
-      <p:par>
-        <p:cTn id="1" dur="indefinite" restart="never" nodeType="tmRoot"/>
-      </p:par>
-    </p:tnLst>
-  </p:timing>
 </p:sld>
 </file>
 
@@ -38247,10 +37897,9 @@
           <a:lstStyle/>
           <a:p>
             <a:r>
-              <a:rPr lang="en-US" dirty="0" smtClean="0"/>
+              <a:rPr lang="en-US" dirty="0"/>
               <a:t>Mini-quiz</a:t>
             </a:r>
-            <a:endParaRPr lang="en-US" dirty="0"/>
           </a:p>
         </p:txBody>
       </p:sp>
@@ -38278,11 +37927,11 @@
               <a:buNone/>
             </a:pPr>
             <a:r>
-              <a:rPr lang="en-US" sz="4400" dirty="0" smtClean="0"/>
+              <a:rPr lang="en-US" sz="4400" dirty="0"/>
               <a:t>Define a new object variable named </a:t>
             </a:r>
             <a:r>
-              <a:rPr lang="en-US" sz="4400" dirty="0" smtClean="0">
+              <a:rPr lang="en-US" sz="4400" dirty="0">
                 <a:solidFill>
                   <a:srgbClr val="000000"/>
                 </a:solidFill>
@@ -38291,7 +37940,7 @@
               <a:t>dog</a:t>
             </a:r>
             <a:r>
-              <a:rPr lang="en-US" sz="4400" dirty="0" smtClean="0"/>
+              <a:rPr lang="en-US" sz="4400" dirty="0"/>
               <a:t> with:</a:t>
             </a:r>
           </a:p>
@@ -38299,34 +37948,18 @@
             <a:pPr marL="57150" indent="0">
               <a:buNone/>
             </a:pPr>
-            <a:endParaRPr lang="en-US" sz="4400" dirty="0" smtClean="0"/>
-          </a:p>
-          <a:p>
-            <a:r>
-              <a:rPr lang="en-US" sz="4400" dirty="0" smtClean="0"/>
-              <a:t>a </a:t>
-            </a:r>
+            <a:endParaRPr lang="en-US" sz="4400" dirty="0"/>
+          </a:p>
+          <a:p>
             <a:r>
               <a:rPr lang="en-US" sz="4400" dirty="0"/>
-              <a:t>name of “Air Bud</a:t>
-            </a:r>
-            <a:r>
-              <a:rPr lang="en-US" sz="4400" dirty="0" smtClean="0"/>
-              <a:t>”</a:t>
-            </a:r>
-          </a:p>
-          <a:p>
-            <a:r>
-              <a:rPr lang="en-US" sz="4400" dirty="0" smtClean="0"/>
-              <a:t>a </a:t>
-            </a:r>
+              <a:t>a name of “Air Bud”</a:t>
+            </a:r>
+          </a:p>
+          <a:p>
             <a:r>
               <a:rPr lang="en-US" sz="4400" dirty="0"/>
-              <a:t>breed of “Golden Retriever</a:t>
-            </a:r>
-            <a:r>
-              <a:rPr lang="en-US" sz="4400" dirty="0" smtClean="0"/>
-              <a:t>” </a:t>
+              <a:t>a breed of “Golden Retriever” </a:t>
             </a:r>
             <a:endParaRPr lang="en-US" sz="4400" i="1" dirty="0"/>
           </a:p>
@@ -38392,13 +38025,6 @@
   <p:transition>
     <p:fade/>
   </p:transition>
-  <p:timing>
-    <p:tnLst>
-      <p:par>
-        <p:cTn id="1" dur="indefinite" restart="never" nodeType="tmRoot"/>
-      </p:par>
-    </p:tnLst>
-  </p:timing>
 </p:sld>
 </file>
 
@@ -38435,10 +38061,9 @@
           <a:lstStyle/>
           <a:p>
             <a:r>
-              <a:rPr lang="en-US" dirty="0" smtClean="0"/>
+              <a:rPr lang="en-US" dirty="0"/>
               <a:t>Mini-quiz</a:t>
             </a:r>
-            <a:endParaRPr lang="en-US" dirty="0"/>
           </a:p>
         </p:txBody>
       </p:sp>
@@ -38570,13 +38195,6 @@
   <p:transition>
     <p:fade/>
   </p:transition>
-  <p:timing>
-    <p:tnLst>
-      <p:par>
-        <p:cTn id="1" dur="indefinite" restart="never" nodeType="tmRoot"/>
-      </p:par>
-    </p:tnLst>
-  </p:timing>
 </p:sld>
 </file>
 
@@ -38613,10 +38231,9 @@
           <a:lstStyle/>
           <a:p>
             <a:r>
-              <a:rPr lang="en-US" dirty="0" smtClean="0"/>
+              <a:rPr lang="en-US" dirty="0"/>
               <a:t>Related Variables</a:t>
             </a:r>
-            <a:endParaRPr lang="en-US" dirty="0"/>
           </a:p>
         </p:txBody>
       </p:sp>
@@ -38757,7 +38374,7 @@
               <a:buNone/>
             </a:pPr>
             <a:r>
-              <a:rPr lang="en-US" sz="4400" dirty="0" err="1">
+              <a:rPr lang="en-US" sz="4400" dirty="0">
                 <a:solidFill>
                   <a:srgbClr val="0000FF"/>
                 </a:solidFill>
@@ -38799,19 +38416,10 @@
                 </a:solidFill>
                 <a:latin typeface="Consolas" panose="020B0609020204030204" pitchFamily="49" charset="0"/>
               </a:rPr>
-              <a:t>"Westlake</a:t>
-            </a:r>
-            <a:r>
-              <a:rPr lang="en-US" sz="4400" dirty="0" smtClean="0">
-                <a:solidFill>
-                  <a:srgbClr val="A31515"/>
-                </a:solidFill>
-                <a:latin typeface="Consolas" panose="020B0609020204030204" pitchFamily="49" charset="0"/>
-              </a:rPr>
-              <a:t>"</a:t>
-            </a:r>
-            <a:r>
-              <a:rPr lang="en-US" sz="4400" dirty="0" smtClean="0">
+              <a:t>"Westlake"</a:t>
+            </a:r>
+            <a:r>
+              <a:rPr lang="en-US" sz="4400" dirty="0">
                 <a:solidFill>
                   <a:srgbClr val="000000"/>
                 </a:solidFill>
@@ -38819,41 +38427,40 @@
               </a:rPr>
               <a:t>;</a:t>
             </a:r>
-            <a:endParaRPr lang="en-US" sz="4400" dirty="0" smtClean="0"/>
+            <a:endParaRPr lang="en-US" sz="4400" dirty="0"/>
           </a:p>
           <a:p>
             <a:endParaRPr lang="en-US" dirty="0"/>
           </a:p>
           <a:p>
             <a:r>
-              <a:rPr lang="en-US" dirty="0" smtClean="0"/>
+              <a:rPr lang="en-US" dirty="0"/>
               <a:t>These variables all describe the same </a:t>
             </a:r>
             <a:r>
-              <a:rPr lang="en-US" i="1" dirty="0" smtClean="0"/>
+              <a:rPr lang="en-US" i="1" dirty="0"/>
               <a:t>person</a:t>
             </a:r>
           </a:p>
           <a:p>
             <a:r>
-              <a:rPr lang="en-US" dirty="0" smtClean="0"/>
+              <a:rPr lang="en-US" dirty="0"/>
               <a:t>Currently, they are not tied together in any way…</a:t>
             </a:r>
           </a:p>
           <a:p>
             <a:r>
-              <a:rPr lang="en-US" dirty="0" smtClean="0"/>
+              <a:rPr lang="en-US" dirty="0"/>
               <a:t>It is possible to use </a:t>
             </a:r>
             <a:r>
-              <a:rPr lang="en-US" b="1" dirty="0" smtClean="0"/>
+              <a:rPr lang="en-US" b="1" dirty="0"/>
               <a:t>objects</a:t>
             </a:r>
             <a:r>
-              <a:rPr lang="en-US" dirty="0" smtClean="0"/>
+              <a:rPr lang="en-US" dirty="0"/>
               <a:t> to group them!</a:t>
             </a:r>
-            <a:endParaRPr lang="en-US" dirty="0"/>
           </a:p>
         </p:txBody>
       </p:sp>
@@ -39122,10 +38729,9 @@
           <a:lstStyle/>
           <a:p>
             <a:r>
-              <a:rPr lang="en-US" dirty="0" smtClean="0"/>
+              <a:rPr lang="en-US" dirty="0"/>
               <a:t>Initializing an object with properties</a:t>
             </a:r>
-            <a:endParaRPr lang="en-US" dirty="0"/>
           </a:p>
         </p:txBody>
       </p:sp>
@@ -39271,7 +38877,7 @@
               <a:buNone/>
             </a:pPr>
             <a:r>
-              <a:rPr lang="en-US" sz="4800" dirty="0" smtClean="0">
+              <a:rPr lang="en-US" sz="4800" dirty="0">
                 <a:solidFill>
                   <a:srgbClr val="000000"/>
                 </a:solidFill>
@@ -39279,12 +38885,6 @@
               </a:rPr>
               <a:t>}</a:t>
             </a:r>
-            <a:endParaRPr lang="en-US" sz="4800" dirty="0">
-              <a:solidFill>
-                <a:srgbClr val="000000"/>
-              </a:solidFill>
-              <a:latin typeface="Consolas" panose="020B0609020204030204" pitchFamily="49" charset="0"/>
-            </a:endParaRPr>
           </a:p>
         </p:txBody>
       </p:sp>
@@ -39319,7 +38919,7 @@
               </a:spcAft>
             </a:pPr>
             <a:r>
-              <a:rPr lang="en-US" sz="3200" dirty="0" err="1" smtClean="0">
+              <a:rPr lang="en-US" sz="3200" dirty="0" err="1">
                 <a:solidFill>
                   <a:srgbClr val="0000FF"/>
                 </a:solidFill>
@@ -39327,7 +38927,7 @@
               </a:rPr>
               <a:t>var</a:t>
             </a:r>
-            <a:endParaRPr lang="en-US" sz="3200" dirty="0" smtClean="0">
+            <a:endParaRPr lang="en-US" sz="3200" dirty="0">
               <a:solidFill>
                 <a:srgbClr val="0000FF"/>
               </a:solidFill>
@@ -39362,7 +38962,7 @@
               </a:spcAft>
             </a:pPr>
             <a:r>
-              <a:rPr lang="en-US" sz="3200" dirty="0" smtClean="0">
+              <a:rPr lang="en-US" sz="3200" dirty="0">
                 <a:solidFill>
                   <a:srgbClr val="000000"/>
                 </a:solidFill>
@@ -39419,7 +39019,7 @@
               </a:spcAft>
             </a:pPr>
             <a:r>
-              <a:rPr lang="en-US" sz="3200" dirty="0" smtClean="0">
+              <a:rPr lang="en-US" sz="3200" dirty="0">
                 <a:solidFill>
                   <a:srgbClr val="000000"/>
                 </a:solidFill>
@@ -39435,20 +39035,12 @@
                   <a:srgbClr val="FF8300"/>
                 </a:solidFill>
               </a:rPr>
-              <a:t>Property </a:t>
-            </a:r>
-            <a:r>
-              <a:rPr lang="en-US" sz="3200" dirty="0" smtClean="0">
-                <a:solidFill>
-                  <a:srgbClr val="FF8300"/>
-                </a:solidFill>
-              </a:rPr>
-              <a:t>Value</a:t>
-            </a:r>
-          </a:p>
-          <a:p>
-            <a:r>
-              <a:rPr lang="en-US" sz="3200" dirty="0" smtClean="0">
+              <a:t>Property Value</a:t>
+            </a:r>
+          </a:p>
+          <a:p>
+            <a:r>
+              <a:rPr lang="en-US" sz="3200" dirty="0">
                 <a:solidFill>
                   <a:srgbClr val="000000"/>
                 </a:solidFill>
@@ -39459,7 +39051,7 @@
           </a:p>
           <a:p>
             <a:r>
-              <a:rPr lang="en-US" sz="3200" dirty="0" smtClean="0">
+              <a:rPr lang="en-US" sz="3200" dirty="0">
                 <a:solidFill>
                   <a:schemeClr val="tx1">
                     <a:lumMod val="60000"/>
@@ -39469,18 +39061,10 @@
               </a:rPr>
               <a:t>Other Properties</a:t>
             </a:r>
-            <a:endParaRPr lang="en-US" sz="3200" dirty="0">
-              <a:solidFill>
-                <a:schemeClr val="tx1">
-                  <a:lumMod val="60000"/>
-                  <a:lumOff val="40000"/>
-                </a:schemeClr>
-              </a:solidFill>
-            </a:endParaRPr>
-          </a:p>
-          <a:p>
-            <a:r>
-              <a:rPr lang="en-US" sz="3200" dirty="0" smtClean="0">
+          </a:p>
+          <a:p>
+            <a:r>
+              <a:rPr lang="en-US" sz="3200" dirty="0">
                 <a:solidFill>
                   <a:srgbClr val="000000"/>
                 </a:solidFill>
@@ -40873,10 +40457,9 @@
           <a:lstStyle/>
           <a:p>
             <a:r>
-              <a:rPr lang="en-US" dirty="0" smtClean="0"/>
+              <a:rPr lang="en-US" dirty="0"/>
               <a:t>Accessing properties from an object</a:t>
             </a:r>
-            <a:endParaRPr lang="en-US" dirty="0"/>
           </a:p>
         </p:txBody>
       </p:sp>
@@ -40941,7 +40524,7 @@
               <a:buNone/>
             </a:pPr>
             <a:r>
-              <a:rPr lang="en-US" sz="4800" dirty="0" err="1" smtClean="0">
+              <a:rPr lang="en-US" sz="4800" dirty="0" err="1">
                 <a:solidFill>
                   <a:srgbClr val="000000"/>
                 </a:solidFill>
@@ -40949,7 +40532,7 @@
               </a:rPr>
               <a:t>person.City</a:t>
             </a:r>
-            <a:endParaRPr lang="en-US" sz="4800" dirty="0" smtClean="0">
+            <a:endParaRPr lang="en-US" sz="4800" dirty="0">
               <a:solidFill>
                 <a:srgbClr val="000000"/>
               </a:solidFill>
@@ -40964,29 +40547,29 @@
           </a:p>
           <a:p>
             <a:r>
-              <a:rPr lang="en-US" sz="3200" dirty="0" smtClean="0"/>
+              <a:rPr lang="en-US" sz="3200" dirty="0"/>
               <a:t>Use the dot notation to </a:t>
             </a:r>
             <a:r>
-              <a:rPr lang="en-US" sz="3200" i="1" dirty="0" smtClean="0"/>
+              <a:rPr lang="en-US" sz="3200" i="1" dirty="0"/>
               <a:t>get</a:t>
             </a:r>
             <a:r>
-              <a:rPr lang="en-US" sz="3200" dirty="0" smtClean="0"/>
+              <a:rPr lang="en-US" sz="3200" dirty="0"/>
               <a:t> and </a:t>
             </a:r>
             <a:r>
-              <a:rPr lang="en-US" sz="3200" i="1" dirty="0" smtClean="0"/>
+              <a:rPr lang="en-US" sz="3200" i="1" dirty="0"/>
               <a:t>set</a:t>
             </a:r>
             <a:r>
-              <a:rPr lang="en-US" sz="3200" dirty="0" smtClean="0"/>
+              <a:rPr lang="en-US" sz="3200" dirty="0"/>
               <a:t> property values</a:t>
             </a:r>
           </a:p>
           <a:p>
             <a:r>
-              <a:rPr lang="en-US" sz="3200" dirty="0" smtClean="0"/>
+              <a:rPr lang="en-US" sz="3200" dirty="0"/>
               <a:t>These are like in DOM manipulation:</a:t>
             </a:r>
           </a:p>
@@ -41011,7 +40594,7 @@
           <a:p>
             <a:pPr marL="742950" lvl="1" indent="-285750"/>
             <a:r>
-              <a:rPr lang="en-US" sz="2800" dirty="0" err="1" smtClean="0">
+              <a:rPr lang="en-US" sz="2800" dirty="0" err="1">
                 <a:solidFill>
                   <a:srgbClr val="000000"/>
                 </a:solidFill>
@@ -41019,7 +40602,7 @@
               </a:rPr>
               <a:t>input.value</a:t>
             </a:r>
-            <a:endParaRPr lang="en-US" sz="2800" dirty="0" smtClean="0"/>
+            <a:endParaRPr lang="en-US" sz="2800" dirty="0"/>
           </a:p>
           <a:p>
             <a:endParaRPr lang="en-US" dirty="0"/>
@@ -41316,10 +40899,9 @@
           <a:lstStyle/>
           <a:p>
             <a:r>
-              <a:rPr lang="en-US" dirty="0" smtClean="0"/>
+              <a:rPr lang="en-US" dirty="0"/>
               <a:t>Accessing properties example</a:t>
             </a:r>
-            <a:endParaRPr lang="en-US" dirty="0"/>
           </a:p>
         </p:txBody>
       </p:sp>
@@ -41471,14 +41053,14 @@
             <a:pPr marL="57150" indent="0">
               <a:buNone/>
             </a:pPr>
-            <a:endParaRPr lang="en-US" dirty="0" smtClean="0"/>
+            <a:endParaRPr lang="en-US" dirty="0"/>
           </a:p>
           <a:p>
             <a:pPr marL="57150" indent="0">
               <a:buNone/>
             </a:pPr>
             <a:r>
-              <a:rPr lang="en-US" sz="3600" dirty="0" smtClean="0"/>
+              <a:rPr lang="en-US" sz="3600" dirty="0"/>
               <a:t>Setting: </a:t>
             </a:r>
             <a:r>
@@ -41506,19 +41088,10 @@
                 </a:solidFill>
                 <a:latin typeface="Consolas" panose="020B0609020204030204" pitchFamily="49" charset="0"/>
               </a:rPr>
-              <a:t>"Cleveland</a:t>
-            </a:r>
-            <a:r>
-              <a:rPr lang="en-US" sz="3600" dirty="0" smtClean="0">
-                <a:solidFill>
-                  <a:srgbClr val="A31515"/>
-                </a:solidFill>
-                <a:latin typeface="Consolas" panose="020B0609020204030204" pitchFamily="49" charset="0"/>
-              </a:rPr>
-              <a:t>"</a:t>
-            </a:r>
-            <a:r>
-              <a:rPr lang="en-US" sz="3600" dirty="0" smtClean="0">
+              <a:t>"Cleveland"</a:t>
+            </a:r>
+            <a:r>
+              <a:rPr lang="en-US" sz="3600" dirty="0">
                 <a:solidFill>
                   <a:srgbClr val="000000"/>
                 </a:solidFill>
@@ -41526,14 +41099,14 @@
               </a:rPr>
               <a:t>;</a:t>
             </a:r>
-            <a:endParaRPr lang="en-US" sz="3600" dirty="0" smtClean="0"/>
+            <a:endParaRPr lang="en-US" sz="3600" dirty="0"/>
           </a:p>
           <a:p>
             <a:pPr marL="57150" indent="0">
               <a:buNone/>
             </a:pPr>
             <a:r>
-              <a:rPr lang="en-US" sz="3600" dirty="0" smtClean="0"/>
+              <a:rPr lang="en-US" sz="3600" dirty="0"/>
               <a:t>Getting: </a:t>
             </a:r>
             <a:r>
@@ -41568,7 +41141,7 @@
             <a:pPr marL="57150" indent="0">
               <a:buNone/>
             </a:pPr>
-            <a:endParaRPr lang="en-US" dirty="0" smtClean="0"/>
+            <a:endParaRPr lang="en-US" dirty="0"/>
           </a:p>
         </p:txBody>
       </p:sp>
@@ -41635,7 +41208,7 @@
                 <a:spcPct val="0"/>
               </a:spcAft>
             </a:pPr>
-            <a:endParaRPr lang="en-US" sz="2400" dirty="0" err="1" smtClean="0">
+            <a:endParaRPr lang="en-US" sz="2400" dirty="0" err="1">
               <a:gradFill>
                 <a:gsLst>
                   <a:gs pos="0">
@@ -41795,7 +41368,7 @@
               <a:t>	City: </a:t>
             </a:r>
             <a:r>
-              <a:rPr lang="en-US" sz="2800" b="1" dirty="0" smtClean="0">
+              <a:rPr lang="en-US" sz="2800" b="1" dirty="0">
                 <a:solidFill>
                   <a:srgbClr val="A31515"/>
                 </a:solidFill>
@@ -41820,7 +41393,7 @@
               </a:buClr>
             </a:pPr>
             <a:r>
-              <a:rPr lang="en-US" sz="2800" dirty="0" smtClean="0">
+              <a:rPr lang="en-US" sz="2800" dirty="0">
                 <a:solidFill>
                   <a:srgbClr val="000000"/>
                 </a:solidFill>
@@ -41828,12 +41401,6 @@
               </a:rPr>
               <a:t>}</a:t>
             </a:r>
-            <a:endParaRPr lang="en-US" sz="2800" dirty="0">
-              <a:solidFill>
-                <a:srgbClr val="000000"/>
-              </a:solidFill>
-              <a:latin typeface="Consolas" panose="020B0609020204030204" pitchFamily="49" charset="0"/>
-            </a:endParaRPr>
           </a:p>
         </p:txBody>
       </p:sp>
@@ -42141,10 +41708,9 @@
           <a:lstStyle/>
           <a:p>
             <a:r>
-              <a:rPr lang="en-US" dirty="0" smtClean="0"/>
+              <a:rPr lang="en-US" dirty="0"/>
               <a:t>Objects example</a:t>
             </a:r>
-            <a:endParaRPr lang="en-US" dirty="0"/>
           </a:p>
         </p:txBody>
       </p:sp>
@@ -42191,13 +41757,6 @@
   <p:transition>
     <p:fade/>
   </p:transition>
-  <p:timing>
-    <p:tnLst>
-      <p:par>
-        <p:cTn id="1" dur="indefinite" restart="never" nodeType="tmRoot"/>
-      </p:par>
-    </p:tnLst>
-  </p:timing>
 </p:sld>
 </file>
 
@@ -42234,10 +41793,9 @@
           <a:lstStyle/>
           <a:p>
             <a:r>
-              <a:rPr lang="en-US" dirty="0" smtClean="0"/>
+              <a:rPr lang="en-US" dirty="0"/>
               <a:t>Mini-quiz</a:t>
             </a:r>
-            <a:endParaRPr lang="en-US" dirty="0"/>
           </a:p>
         </p:txBody>
       </p:sp>
@@ -42487,7 +42045,7 @@
               <a:buNone/>
             </a:pPr>
             <a:r>
-              <a:rPr lang="en-US" sz="3600" dirty="0" smtClean="0">
+              <a:rPr lang="en-US" sz="3600" dirty="0">
                 <a:solidFill>
                   <a:srgbClr val="000000"/>
                 </a:solidFill>
@@ -42495,12 +42053,6 @@
               </a:rPr>
               <a:t>}</a:t>
             </a:r>
-            <a:endParaRPr lang="en-US" sz="3600" dirty="0">
-              <a:solidFill>
-                <a:srgbClr val="000000"/>
-              </a:solidFill>
-              <a:latin typeface="Consolas" panose="020B0609020204030204" pitchFamily="49" charset="0"/>
-            </a:endParaRPr>
           </a:p>
         </p:txBody>
       </p:sp>
@@ -42556,21 +42108,8 @@
                   <a:srgbClr val="56565A"/>
                 </a:solidFill>
               </a:rPr>
-              <a:t> the departure city from this object</a:t>
-            </a:r>
-            <a:r>
-              <a:rPr lang="en-US" sz="2800" dirty="0" smtClean="0">
-                <a:solidFill>
-                  <a:srgbClr val="56565A"/>
-                </a:solidFill>
-              </a:rPr>
-              <a:t>?</a:t>
-            </a:r>
-            <a:endParaRPr lang="en-US" sz="2800" dirty="0">
-              <a:solidFill>
-                <a:srgbClr val="56565A"/>
-              </a:solidFill>
-            </a:endParaRPr>
+              <a:t> the departure city from this object?</a:t>
+            </a:r>
           </a:p>
         </p:txBody>
       </p:sp>
@@ -42628,13 +42167,6 @@
   <p:transition>
     <p:fade/>
   </p:transition>
-  <p:timing>
-    <p:tnLst>
-      <p:par>
-        <p:cTn id="1" dur="indefinite" restart="never" nodeType="tmRoot"/>
-      </p:par>
-    </p:tnLst>
-  </p:timing>
 </p:sld>
 </file>
 
@@ -42671,10 +42203,9 @@
           <a:lstStyle/>
           <a:p>
             <a:r>
-              <a:rPr lang="en-US" dirty="0" smtClean="0"/>
+              <a:rPr lang="en-US" dirty="0"/>
               <a:t>Mini-quiz</a:t>
             </a:r>
-            <a:endParaRPr lang="en-US" dirty="0"/>
           </a:p>
         </p:txBody>
       </p:sp>
@@ -42924,7 +42455,7 @@
               <a:buNone/>
             </a:pPr>
             <a:r>
-              <a:rPr lang="en-US" sz="3600" dirty="0" smtClean="0">
+              <a:rPr lang="en-US" sz="3600" dirty="0">
                 <a:solidFill>
                   <a:srgbClr val="000000"/>
                 </a:solidFill>
@@ -42932,12 +42463,6 @@
               </a:rPr>
               <a:t>}</a:t>
             </a:r>
-            <a:endParaRPr lang="en-US" sz="3600" dirty="0">
-              <a:solidFill>
-                <a:srgbClr val="000000"/>
-              </a:solidFill>
-              <a:latin typeface="Consolas" panose="020B0609020204030204" pitchFamily="49" charset="0"/>
-            </a:endParaRPr>
           </a:p>
         </p:txBody>
       </p:sp>
@@ -42972,7 +42497,7 @@
               </a:buClr>
             </a:pPr>
             <a:r>
-              <a:rPr lang="en-US" sz="4400" dirty="0" err="1" smtClean="0">
+              <a:rPr lang="en-US" sz="4400" dirty="0" err="1">
                 <a:solidFill>
                   <a:schemeClr val="accent5">
                     <a:lumMod val="10000"/>
@@ -43047,13 +42572,6 @@
   <p:transition>
     <p:fade/>
   </p:transition>
-  <p:timing>
-    <p:tnLst>
-      <p:par>
-        <p:cTn id="1" dur="indefinite" restart="never" nodeType="tmRoot"/>
-      </p:par>
-    </p:tnLst>
-  </p:timing>
 </p:sld>
 </file>
 
@@ -43090,10 +42608,9 @@
           <a:lstStyle/>
           <a:p>
             <a:r>
-              <a:rPr lang="en-US" dirty="0" smtClean="0"/>
+              <a:rPr lang="en-US" dirty="0"/>
               <a:t>Mini-quiz</a:t>
             </a:r>
-            <a:endParaRPr lang="en-US" dirty="0"/>
           </a:p>
         </p:txBody>
       </p:sp>
@@ -43343,7 +42860,7 @@
               <a:buNone/>
             </a:pPr>
             <a:r>
-              <a:rPr lang="en-US" sz="3600" dirty="0" smtClean="0">
+              <a:rPr lang="en-US" sz="3600" dirty="0">
                 <a:solidFill>
                   <a:srgbClr val="000000"/>
                 </a:solidFill>
@@ -43351,12 +42868,6 @@
               </a:rPr>
               <a:t>}</a:t>
             </a:r>
-            <a:endParaRPr lang="en-US" sz="3600" dirty="0">
-              <a:solidFill>
-                <a:srgbClr val="000000"/>
-              </a:solidFill>
-              <a:latin typeface="Consolas" panose="020B0609020204030204" pitchFamily="49" charset="0"/>
-            </a:endParaRPr>
           </a:p>
         </p:txBody>
       </p:sp>
@@ -43412,37 +42923,8 @@
                   <a:srgbClr val="56565A"/>
                 </a:solidFill>
               </a:rPr>
-              <a:t> the </a:t>
-            </a:r>
-            <a:r>
-              <a:rPr lang="en-US" sz="2800" dirty="0" smtClean="0">
-                <a:solidFill>
-                  <a:srgbClr val="56565A"/>
-                </a:solidFill>
-              </a:rPr>
-              <a:t>arrival </a:t>
-            </a:r>
-            <a:r>
-              <a:rPr lang="en-US" sz="2800" dirty="0">
-                <a:solidFill>
-                  <a:srgbClr val="56565A"/>
-                </a:solidFill>
-              </a:rPr>
-              <a:t>city from this object</a:t>
-            </a:r>
-            <a:r>
-              <a:rPr lang="en-US" sz="2800" dirty="0" smtClean="0">
-                <a:solidFill>
-                  <a:srgbClr val="56565A"/>
-                </a:solidFill>
-              </a:rPr>
-              <a:t>?</a:t>
-            </a:r>
-            <a:endParaRPr lang="en-US" sz="2800" dirty="0">
-              <a:solidFill>
-                <a:srgbClr val="56565A"/>
-              </a:solidFill>
-            </a:endParaRPr>
+              <a:t> the arrival city from this object?</a:t>
+            </a:r>
           </a:p>
         </p:txBody>
       </p:sp>
@@ -43500,13 +42982,6 @@
   <p:transition>
     <p:fade/>
   </p:transition>
-  <p:timing>
-    <p:tnLst>
-      <p:par>
-        <p:cTn id="1" dur="indefinite" restart="never" nodeType="tmRoot"/>
-      </p:par>
-    </p:tnLst>
-  </p:timing>
 </p:sld>
 </file>
 

</xml_diff>

<commit_message>
Update gitbook 2022-08-17 16:15:24
</commit_message>
<xml_diff>
--- a/Week09/JavaScriptObjects.pptx
+++ b/Week09/JavaScriptObjects.pptx
@@ -221,7 +221,7 @@
           <a:p>
             <a:fld id="{19104133-B5B0-4351-8158-4F0E5EB1E2BF}" type="datetimeFigureOut">
               <a:rPr lang="en-US" smtClean="0"/>
-              <a:t>4/13/2020</a:t>
+              <a:t>8/25/2021</a:t>
             </a:fld>
             <a:endParaRPr lang="en-US"/>
           </a:p>
@@ -285,38 +285,37 @@
           <a:p>
             <a:pPr lvl="0"/>
             <a:r>
-              <a:rPr lang="en-US" smtClean="0"/>
+              <a:rPr lang="en-US"/>
               <a:t>Edit Master text styles</a:t>
             </a:r>
           </a:p>
           <a:p>
             <a:pPr lvl="1"/>
             <a:r>
-              <a:rPr lang="en-US" smtClean="0"/>
+              <a:rPr lang="en-US"/>
               <a:t>Second level</a:t>
             </a:r>
           </a:p>
           <a:p>
             <a:pPr lvl="2"/>
             <a:r>
-              <a:rPr lang="en-US" smtClean="0"/>
+              <a:rPr lang="en-US"/>
               <a:t>Third level</a:t>
             </a:r>
           </a:p>
           <a:p>
             <a:pPr lvl="3"/>
             <a:r>
-              <a:rPr lang="en-US" smtClean="0"/>
+              <a:rPr lang="en-US"/>
               <a:t>Fourth level</a:t>
             </a:r>
           </a:p>
           <a:p>
             <a:pPr lvl="4"/>
             <a:r>
-              <a:rPr lang="en-US" smtClean="0"/>
+              <a:rPr lang="en-US"/>
               <a:t>Fifth level</a:t>
             </a:r>
-            <a:endParaRPr lang="en-US"/>
           </a:p>
         </p:txBody>
       </p:sp>
@@ -534,29 +533,29 @@
           <a:lstStyle/>
           <a:p>
             <a:r>
-              <a:rPr lang="en-US" dirty="0" smtClean="0"/>
+              <a:rPr lang="en-US" dirty="0"/>
               <a:t>Introduce the idea of related variables all grouped together.</a:t>
             </a:r>
           </a:p>
           <a:p>
-            <a:endParaRPr lang="en-US" dirty="0" smtClean="0"/>
-          </a:p>
-          <a:p>
-            <a:r>
-              <a:rPr lang="en-US" dirty="0" smtClean="0"/>
+            <a:endParaRPr lang="en-US" dirty="0"/>
+          </a:p>
+          <a:p>
+            <a:r>
+              <a:rPr lang="en-US" dirty="0"/>
               <a:t>All of these variables are properties of a person,</a:t>
             </a:r>
             <a:r>
-              <a:rPr lang="en-US" baseline="0" dirty="0" smtClean="0"/>
+              <a:rPr lang="en-US" baseline="0" dirty="0"/>
               <a:t> but they all exist separately.</a:t>
             </a:r>
           </a:p>
           <a:p>
-            <a:endParaRPr lang="en-US" baseline="0" dirty="0" smtClean="0"/>
-          </a:p>
-          <a:p>
-            <a:r>
-              <a:rPr lang="en-US" baseline="0" dirty="0" smtClean="0"/>
+            <a:endParaRPr lang="en-US" baseline="0" dirty="0"/>
+          </a:p>
+          <a:p>
+            <a:r>
+              <a:rPr lang="en-US" baseline="0" dirty="0"/>
               <a:t>Objects could be used to group these properties together.</a:t>
             </a:r>
             <a:endParaRPr lang="en-US" dirty="0"/>
@@ -644,11 +643,11 @@
           <a:lstStyle/>
           <a:p>
             <a:r>
-              <a:rPr lang="en-US" b="0" dirty="0" smtClean="0"/>
+              <a:rPr lang="en-US" b="0" dirty="0"/>
               <a:t>For this part, go around the room (or</a:t>
             </a:r>
             <a:r>
-              <a:rPr lang="en-US" b="0" baseline="0" dirty="0" smtClean="0"/>
+              <a:rPr lang="en-US" b="0" baseline="0" dirty="0"/>
               <a:t> ask students to come up to the whiteboard) to answer the questions.</a:t>
             </a:r>
           </a:p>
@@ -735,11 +734,11 @@
           <a:lstStyle/>
           <a:p>
             <a:r>
-              <a:rPr lang="en-US" b="0" dirty="0" smtClean="0"/>
+              <a:rPr lang="en-US" b="0" dirty="0"/>
               <a:t>For this part, go around the room (or</a:t>
             </a:r>
             <a:r>
-              <a:rPr lang="en-US" b="0" baseline="0" dirty="0" smtClean="0"/>
+              <a:rPr lang="en-US" b="0" baseline="0" dirty="0"/>
               <a:t> ask students to come up to the whiteboard) to answer the questions.</a:t>
             </a:r>
           </a:p>
@@ -826,11 +825,11 @@
           <a:lstStyle/>
           <a:p>
             <a:r>
-              <a:rPr lang="en-US" b="0" dirty="0" smtClean="0"/>
+              <a:rPr lang="en-US" b="0" dirty="0"/>
               <a:t>For this part, go around the room (or</a:t>
             </a:r>
             <a:r>
-              <a:rPr lang="en-US" b="0" baseline="0" dirty="0" smtClean="0"/>
+              <a:rPr lang="en-US" b="0" baseline="0" dirty="0"/>
               <a:t> ask students to come up to the whiteboard) to answer the questions.</a:t>
             </a:r>
           </a:p>
@@ -934,43 +933,43 @@
               <a:defRPr/>
             </a:pPr>
             <a:r>
-              <a:rPr lang="en-US" dirty="0" smtClean="0"/>
+              <a:rPr lang="en-US" dirty="0"/>
               <a:t>This </a:t>
             </a:r>
             <a:r>
-              <a:rPr lang="en-US" b="1" dirty="0" smtClean="0"/>
+              <a:rPr lang="en-US" b="1" dirty="0"/>
               <a:t>person</a:t>
             </a:r>
             <a:r>
-              <a:rPr lang="en-US" b="0" dirty="0" smtClean="0"/>
+              <a:rPr lang="en-US" b="0" dirty="0"/>
               <a:t> variable is now an </a:t>
             </a:r>
             <a:r>
-              <a:rPr lang="en-US" b="0" i="1" dirty="0" smtClean="0"/>
+              <a:rPr lang="en-US" b="0" i="1" dirty="0"/>
               <a:t>object</a:t>
             </a:r>
             <a:r>
-              <a:rPr lang="en-US" b="0" i="0" dirty="0" smtClean="0"/>
+              <a:rPr lang="en-US" b="0" i="0" dirty="0"/>
               <a:t> that contains multiple </a:t>
             </a:r>
             <a:r>
-              <a:rPr lang="en-US" b="0" i="1" dirty="0" smtClean="0"/>
+              <a:rPr lang="en-US" b="0" i="1" dirty="0"/>
               <a:t>properties</a:t>
             </a:r>
             <a:r>
-              <a:rPr lang="en-US" b="0" i="0" dirty="0" smtClean="0"/>
+              <a:rPr lang="en-US" b="0" i="0" dirty="0"/>
               <a:t>. </a:t>
             </a:r>
             <a:r>
-              <a:rPr lang="en-US" b="1" i="0" dirty="0" smtClean="0"/>
+              <a:rPr lang="en-US" b="1" i="0" dirty="0"/>
               <a:t>Properties</a:t>
             </a:r>
             <a:r>
-              <a:rPr lang="en-US" b="0" i="0" dirty="0" smtClean="0"/>
+              <a:rPr lang="en-US" b="0" i="0" dirty="0"/>
               <a:t> are the variables</a:t>
             </a:r>
             <a:r>
-              <a:rPr lang="en-US" b="0" i="0" baseline="0" dirty="0" smtClean="0"/>
+              <a:rPr lang="en-US" b="0" i="0" baseline="0" dirty="0"/>
               <a:t> that are part of objects.</a:t>
             </a:r>
           </a:p>
@@ -992,7 +991,7 @@
               <a:tabLst/>
               <a:defRPr/>
             </a:pPr>
-            <a:endParaRPr lang="en-US" b="0" i="0" baseline="0" dirty="0" smtClean="0"/>
+            <a:endParaRPr lang="en-US" b="0" i="0" baseline="0" dirty="0"/>
           </a:p>
           <a:p>
             <a:pPr marL="0" marR="0" lvl="0" indent="0" algn="l" defTabSz="914400" rtl="0" eaLnBrk="1" fontAlgn="auto" latinLnBrk="0" hangingPunct="1">
@@ -1013,11 +1012,11 @@
               <a:defRPr/>
             </a:pPr>
             <a:r>
-              <a:rPr lang="en-US" b="0" i="0" baseline="0" dirty="0" smtClean="0"/>
+              <a:rPr lang="en-US" b="0" i="0" baseline="0" dirty="0"/>
               <a:t>Break down the syntax for a JS object</a:t>
             </a:r>
             <a:r>
-              <a:rPr lang="en-US" baseline="0" dirty="0" smtClean="0"/>
+              <a:rPr lang="en-US" baseline="0" dirty="0"/>
               <a:t>. Make sure to make a note of each character used.</a:t>
             </a:r>
             <a:endParaRPr lang="en-US" dirty="0"/>
@@ -1105,36 +1104,36 @@
           <a:lstStyle/>
           <a:p>
             <a:r>
-              <a:rPr lang="en-US" dirty="0" smtClean="0"/>
+              <a:rPr lang="en-US" dirty="0"/>
               <a:t>Note that students</a:t>
             </a:r>
             <a:r>
-              <a:rPr lang="en-US" baseline="0" dirty="0" smtClean="0"/>
+              <a:rPr lang="en-US" baseline="0" dirty="0"/>
               <a:t> can treat </a:t>
             </a:r>
             <a:r>
-              <a:rPr lang="en-US" b="1" baseline="0" dirty="0" err="1" smtClean="0"/>
+              <a:rPr lang="en-US" b="1" baseline="0" dirty="0" err="1"/>
               <a:t>person.Name</a:t>
             </a:r>
             <a:r>
-              <a:rPr lang="en-US" b="0" baseline="0" dirty="0" smtClean="0"/>
+              <a:rPr lang="en-US" b="0" baseline="0" dirty="0"/>
               <a:t> like any other variable – they can access the value, or set the value. It will update the property on the object.</a:t>
             </a:r>
           </a:p>
           <a:p>
-            <a:endParaRPr lang="en-US" b="0" baseline="0" dirty="0" smtClean="0"/>
-          </a:p>
-          <a:p>
-            <a:r>
-              <a:rPr lang="en-US" b="0" baseline="0" dirty="0" smtClean="0"/>
+            <a:endParaRPr lang="en-US" b="0" baseline="0" dirty="0"/>
+          </a:p>
+          <a:p>
+            <a:r>
+              <a:rPr lang="en-US" b="0" baseline="0" dirty="0"/>
               <a:t>On the next slide there is a </a:t>
             </a:r>
             <a:r>
-              <a:rPr lang="en-US" b="0" baseline="0" dirty="0" err="1" smtClean="0"/>
+              <a:rPr lang="en-US" b="0" baseline="0" dirty="0" err="1"/>
               <a:t>Repl</a:t>
             </a:r>
             <a:r>
-              <a:rPr lang="en-US" b="0" baseline="0" dirty="0" smtClean="0"/>
+              <a:rPr lang="en-US" b="0" baseline="0" dirty="0"/>
               <a:t> where students can see this code in action.</a:t>
             </a:r>
             <a:endParaRPr lang="en-US" dirty="0"/>
@@ -1239,7 +1238,7 @@
               <a:defRPr/>
             </a:pPr>
             <a:r>
-              <a:rPr lang="en-US" dirty="0" smtClean="0"/>
+              <a:rPr lang="en-US" dirty="0"/>
               <a:t>Show some examples of getting and setting properties.</a:t>
             </a:r>
           </a:p>
@@ -1261,7 +1260,7 @@
               <a:tabLst/>
               <a:defRPr/>
             </a:pPr>
-            <a:endParaRPr lang="en-US" dirty="0" smtClean="0"/>
+            <a:endParaRPr lang="en-US" dirty="0"/>
           </a:p>
           <a:p>
             <a:pPr marL="0" marR="0" lvl="0" indent="0" algn="l" defTabSz="914400" rtl="0" eaLnBrk="1" fontAlgn="auto" latinLnBrk="0" hangingPunct="1">
@@ -1282,14 +1281,14 @@
               <a:defRPr/>
             </a:pPr>
             <a:r>
-              <a:rPr lang="en-US" dirty="0" smtClean="0"/>
+              <a:rPr lang="en-US" dirty="0"/>
               <a:t>Ask the students what the user would see in the </a:t>
             </a:r>
             <a:r>
-              <a:rPr lang="en-US" b="1" dirty="0" smtClean="0"/>
+              <a:rPr lang="en-US" b="1" dirty="0"/>
               <a:t>alert</a:t>
             </a:r>
-            <a:endParaRPr lang="en-US" dirty="0" smtClean="0"/>
+            <a:endParaRPr lang="en-US" dirty="0"/>
           </a:p>
           <a:p>
             <a:endParaRPr lang="en-US" dirty="0"/>
@@ -1377,24 +1376,24 @@
           <a:lstStyle/>
           <a:p>
             <a:r>
-              <a:rPr lang="en-US" dirty="0" smtClean="0"/>
+              <a:rPr lang="en-US" dirty="0"/>
               <a:t>For the </a:t>
             </a:r>
             <a:r>
-              <a:rPr lang="en-US" dirty="0" err="1" smtClean="0"/>
+              <a:rPr lang="en-US" dirty="0" err="1"/>
               <a:t>Repl</a:t>
             </a:r>
             <a:r>
-              <a:rPr lang="en-US" dirty="0" smtClean="0"/>
+              <a:rPr lang="en-US" dirty="0"/>
               <a:t>,</a:t>
             </a:r>
             <a:r>
-              <a:rPr lang="en-US" baseline="0" dirty="0" smtClean="0"/>
+              <a:rPr lang="en-US" baseline="0" dirty="0"/>
               <a:t> show objects in action. Show how to initialize a new object, and get/set property values on an object.</a:t>
             </a:r>
           </a:p>
           <a:p>
-            <a:endParaRPr lang="en-US" baseline="0" dirty="0" smtClean="0"/>
+            <a:endParaRPr lang="en-US" baseline="0" dirty="0"/>
           </a:p>
           <a:p>
             <a:pPr marL="0" marR="0" lvl="0" indent="0" algn="l" defTabSz="914400" rtl="0" eaLnBrk="1" fontAlgn="auto" latinLnBrk="0" hangingPunct="1">
@@ -1415,14 +1414,14 @@
               <a:defRPr/>
             </a:pPr>
             <a:r>
-              <a:rPr lang="en-US" dirty="0" smtClean="0"/>
+              <a:rPr lang="en-US" dirty="0"/>
               <a:t>Play around with the example, changing the values.</a:t>
             </a:r>
             <a:r>
-              <a:rPr lang="en-US" baseline="0" dirty="0" smtClean="0"/>
+              <a:rPr lang="en-US" baseline="0" dirty="0"/>
               <a:t> Consider having many menu items; in that case, these objects would be necessary to separate each group of variables</a:t>
             </a:r>
-            <a:endParaRPr lang="en-US" dirty="0" smtClean="0"/>
+            <a:endParaRPr lang="en-US" dirty="0"/>
           </a:p>
         </p:txBody>
       </p:sp>
@@ -1507,11 +1506,11 @@
           <a:lstStyle/>
           <a:p>
             <a:r>
-              <a:rPr lang="en-US" b="0" dirty="0" smtClean="0"/>
+              <a:rPr lang="en-US" b="0" dirty="0"/>
               <a:t>For this part, go around the room (or</a:t>
             </a:r>
             <a:r>
-              <a:rPr lang="en-US" b="0" baseline="0" dirty="0" smtClean="0"/>
+              <a:rPr lang="en-US" b="0" baseline="0" dirty="0"/>
               <a:t> ask students to come up to the whiteboard) to answer the questions.</a:t>
             </a:r>
           </a:p>
@@ -1598,11 +1597,11 @@
           <a:lstStyle/>
           <a:p>
             <a:r>
-              <a:rPr lang="en-US" b="0" dirty="0" smtClean="0"/>
+              <a:rPr lang="en-US" b="0" dirty="0"/>
               <a:t>For this part, go around the room (or</a:t>
             </a:r>
             <a:r>
-              <a:rPr lang="en-US" b="0" baseline="0" dirty="0" smtClean="0"/>
+              <a:rPr lang="en-US" b="0" baseline="0" dirty="0"/>
               <a:t> ask students to come up to the whiteboard) to answer the questions.</a:t>
             </a:r>
           </a:p>
@@ -1689,11 +1688,11 @@
           <a:lstStyle/>
           <a:p>
             <a:r>
-              <a:rPr lang="en-US" b="0" dirty="0" smtClean="0"/>
+              <a:rPr lang="en-US" b="0" dirty="0"/>
               <a:t>For this part, go around the room (or</a:t>
             </a:r>
             <a:r>
-              <a:rPr lang="en-US" b="0" baseline="0" dirty="0" smtClean="0"/>
+              <a:rPr lang="en-US" b="0" baseline="0" dirty="0"/>
               <a:t> ask students to come up to the whiteboard) to answer the questions.</a:t>
             </a:r>
           </a:p>
@@ -1780,11 +1779,11 @@
           <a:lstStyle/>
           <a:p>
             <a:r>
-              <a:rPr lang="en-US" b="0" dirty="0" smtClean="0"/>
+              <a:rPr lang="en-US" b="0" dirty="0"/>
               <a:t>For this part, go around the room (or</a:t>
             </a:r>
             <a:r>
-              <a:rPr lang="en-US" b="0" baseline="0" dirty="0" smtClean="0"/>
+              <a:rPr lang="en-US" b="0" baseline="0" dirty="0"/>
               <a:t> ask students to come up to the whiteboard) to answer the questions.</a:t>
             </a:r>
           </a:p>
@@ -1966,15 +1965,7 @@
           <a:p>
             <a:r>
               <a:rPr lang="en-US" dirty="0"/>
-              <a:t>Click to edit Master </a:t>
-            </a:r>
-            <a:r>
-              <a:rPr lang="en-US" dirty="0" smtClean="0"/>
-              <a:t>subtitle </a:t>
-            </a:r>
-            <a:r>
-              <a:rPr lang="en-US" dirty="0"/>
-              <a:t>style</a:t>
+              <a:t>Click to edit Master subtitle style</a:t>
             </a:r>
           </a:p>
         </p:txBody>
@@ -2016,7 +2007,7 @@
             <a:fld id="{1C2D31DE-C454-491C-B5C3-F097855E3DF7}" type="datetime4">
               <a:rPr lang="en-US" smtClean="0"/>
               <a:pPr/>
-              <a:t>April 13, 2020</a:t>
+              <a:t>August 25, 2021</a:t>
             </a:fld>
             <a:endParaRPr lang="en-US" dirty="0"/>
           </a:p>
@@ -5090,17 +5081,16 @@
           <a:p>
             <a:pPr lvl="0"/>
             <a:r>
-              <a:rPr lang="en-US" dirty="0" smtClean="0"/>
+              <a:rPr lang="en-US" dirty="0"/>
               <a:t>Presenter Name</a:t>
             </a:r>
             <a:br>
-              <a:rPr lang="en-US" dirty="0" smtClean="0"/>
+              <a:rPr lang="en-US" dirty="0"/>
             </a:br>
             <a:r>
-              <a:rPr lang="en-US" dirty="0" smtClean="0"/>
+              <a:rPr lang="en-US" dirty="0"/>
               <a:t>Presenter Title</a:t>
             </a:r>
-            <a:endParaRPr lang="en-US" dirty="0"/>
           </a:p>
         </p:txBody>
       </p:sp>
@@ -5117,13 +5107,6 @@
   <p:transition>
     <p:fade/>
   </p:transition>
-  <p:timing>
-    <p:tnLst>
-      <p:par>
-        <p:cTn id="1" dur="indefinite" restart="never" nodeType="tmRoot"/>
-      </p:par>
-    </p:tnLst>
-  </p:timing>
   <p:hf sldNum="0" hdr="0" ftr="0"/>
 </p:sldLayout>
 </file>
@@ -5416,7 +5399,7 @@
           <a:p>
             <a:fld id="{5958763E-B898-436D-883D-03711491D54A}" type="datetimeFigureOut">
               <a:rPr lang="en-US" smtClean="0"/>
-              <a:t>4/13/2020</a:t>
+              <a:t>8/25/2021</a:t>
             </a:fld>
             <a:endParaRPr lang="en-US"/>
           </a:p>
@@ -5489,13 +5472,6 @@
   <p:transition>
     <p:fade/>
   </p:transition>
-  <p:timing>
-    <p:tnLst>
-      <p:par>
-        <p:cTn id="1" dur="indefinite" restart="never" nodeType="tmRoot"/>
-      </p:par>
-    </p:tnLst>
-  </p:timing>
 </p:sldLayout>
 </file>
 
@@ -5544,10 +5520,9 @@
           </a:lstStyle>
           <a:p>
             <a:r>
-              <a:rPr lang="en-US" dirty="0" smtClean="0"/>
+              <a:rPr lang="en-US" dirty="0"/>
               <a:t>Click icon to add picture</a:t>
             </a:r>
-            <a:endParaRPr lang="en-US" dirty="0"/>
           </a:p>
         </p:txBody>
       </p:sp>
@@ -5617,7 +5592,7 @@
           <a:p>
             <a:fld id="{5958763E-B898-436D-883D-03711491D54A}" type="datetimeFigureOut">
               <a:rPr lang="en-US" smtClean="0"/>
-              <a:t>4/13/2020</a:t>
+              <a:t>8/25/2021</a:t>
             </a:fld>
             <a:endParaRPr lang="en-US"/>
           </a:p>
@@ -5690,13 +5665,6 @@
   <p:transition>
     <p:fade/>
   </p:transition>
-  <p:timing>
-    <p:tnLst>
-      <p:par>
-        <p:cTn id="1" dur="indefinite" restart="never" nodeType="tmRoot"/>
-      </p:par>
-    </p:tnLst>
-  </p:timing>
 </p:sldLayout>
 </file>
 
@@ -5874,7 +5842,7 @@
           <a:p>
             <a:fld id="{5958763E-B898-436D-883D-03711491D54A}" type="datetimeFigureOut">
               <a:rPr lang="en-US" smtClean="0"/>
-              <a:t>4/13/2020</a:t>
+              <a:t>8/25/2021</a:t>
             </a:fld>
             <a:endParaRPr lang="en-US"/>
           </a:p>
@@ -5947,13 +5915,6 @@
   <p:transition>
     <p:fade/>
   </p:transition>
-  <p:timing>
-    <p:tnLst>
-      <p:par>
-        <p:cTn id="1" dur="indefinite" restart="never" nodeType="tmRoot"/>
-      </p:par>
-    </p:tnLst>
-  </p:timing>
 </p:sldLayout>
 </file>
 
@@ -6229,7 +6190,7 @@
           <a:p>
             <a:fld id="{5958763E-B898-436D-883D-03711491D54A}" type="datetimeFigureOut">
               <a:rPr lang="en-US" smtClean="0"/>
-              <a:t>4/13/2020</a:t>
+              <a:t>8/25/2021</a:t>
             </a:fld>
             <a:endParaRPr lang="en-US"/>
           </a:p>
@@ -6290,13 +6251,6 @@
   <p:transition>
     <p:fade/>
   </p:transition>
-  <p:timing>
-    <p:tnLst>
-      <p:par>
-        <p:cTn id="1" dur="indefinite" restart="never" nodeType="tmRoot"/>
-      </p:par>
-    </p:tnLst>
-  </p:timing>
 </p:sldLayout>
 </file>
 
@@ -6652,7 +6606,7 @@
           <a:p>
             <a:fld id="{5958763E-B898-436D-883D-03711491D54A}" type="datetimeFigureOut">
               <a:rPr lang="en-US" smtClean="0"/>
-              <a:t>4/13/2020</a:t>
+              <a:t>8/25/2021</a:t>
             </a:fld>
             <a:endParaRPr lang="en-US"/>
           </a:p>
@@ -6713,13 +6667,6 @@
   <p:transition>
     <p:fade/>
   </p:transition>
-  <p:timing>
-    <p:tnLst>
-      <p:par>
-        <p:cTn id="1" dur="indefinite" restart="never" nodeType="tmRoot"/>
-      </p:par>
-    </p:tnLst>
-  </p:timing>
 </p:sldLayout>
 </file>
 
@@ -7160,7 +7107,7 @@
           <a:p>
             <a:fld id="{5958763E-B898-436D-883D-03711491D54A}" type="datetimeFigureOut">
               <a:rPr lang="en-US" smtClean="0"/>
-              <a:t>4/13/2020</a:t>
+              <a:t>8/25/2021</a:t>
             </a:fld>
             <a:endParaRPr lang="en-US"/>
           </a:p>
@@ -7221,13 +7168,6 @@
   <p:transition>
     <p:fade/>
   </p:transition>
-  <p:timing>
-    <p:tnLst>
-      <p:par>
-        <p:cTn id="1" dur="indefinite" restart="never" nodeType="tmRoot"/>
-      </p:par>
-    </p:tnLst>
-  </p:timing>
 </p:sldLayout>
 </file>
 
@@ -7618,7 +7558,7 @@
           <a:p>
             <a:fld id="{5958763E-B898-436D-883D-03711491D54A}" type="datetimeFigureOut">
               <a:rPr lang="en-US" smtClean="0"/>
-              <a:t>4/13/2020</a:t>
+              <a:t>8/25/2021</a:t>
             </a:fld>
             <a:endParaRPr lang="en-US"/>
           </a:p>
@@ -7679,13 +7619,6 @@
   <p:transition>
     <p:fade/>
   </p:transition>
-  <p:timing>
-    <p:tnLst>
-      <p:par>
-        <p:cTn id="1" dur="indefinite" restart="never" nodeType="tmRoot"/>
-      </p:par>
-    </p:tnLst>
-  </p:timing>
 </p:sldLayout>
 </file>
 
@@ -8236,7 +8169,7 @@
           <a:p>
             <a:fld id="{5958763E-B898-436D-883D-03711491D54A}" type="datetimeFigureOut">
               <a:rPr lang="en-US" smtClean="0"/>
-              <a:t>4/13/2020</a:t>
+              <a:t>8/25/2021</a:t>
             </a:fld>
             <a:endParaRPr lang="en-US"/>
           </a:p>
@@ -8297,13 +8230,6 @@
   <p:transition>
     <p:fade/>
   </p:transition>
-  <p:timing>
-    <p:tnLst>
-      <p:par>
-        <p:cTn id="1" dur="indefinite" restart="never" nodeType="tmRoot"/>
-      </p:par>
-    </p:tnLst>
-  </p:timing>
 </p:sldLayout>
 </file>
 
@@ -9014,7 +8940,7 @@
           <a:p>
             <a:fld id="{5958763E-B898-436D-883D-03711491D54A}" type="datetimeFigureOut">
               <a:rPr lang="en-US" smtClean="0"/>
-              <a:t>4/13/2020</a:t>
+              <a:t>8/25/2021</a:t>
             </a:fld>
             <a:endParaRPr lang="en-US"/>
           </a:p>
@@ -9075,13 +9001,6 @@
   <p:transition>
     <p:fade/>
   </p:transition>
-  <p:timing>
-    <p:tnLst>
-      <p:par>
-        <p:cTn id="1" dur="indefinite" restart="never" nodeType="tmRoot"/>
-      </p:par>
-    </p:tnLst>
-  </p:timing>
 </p:sldLayout>
 </file>
 
@@ -9125,7 +9044,7 @@
           <a:p>
             <a:fld id="{5958763E-B898-436D-883D-03711491D54A}" type="datetimeFigureOut">
               <a:rPr lang="en-US" smtClean="0"/>
-              <a:t>4/13/2020</a:t>
+              <a:t>8/25/2021</a:t>
             </a:fld>
             <a:endParaRPr lang="en-US"/>
           </a:p>
@@ -9198,13 +9117,6 @@
   <p:transition>
     <p:fade/>
   </p:transition>
-  <p:timing>
-    <p:tnLst>
-      <p:par>
-        <p:cTn id="1" dur="indefinite" restart="never" nodeType="tmRoot"/>
-      </p:par>
-    </p:tnLst>
-  </p:timing>
 </p:sldLayout>
 </file>
 
@@ -9284,7 +9196,7 @@
                 <a:spcPct val="0"/>
               </a:spcAft>
             </a:pPr>
-            <a:endParaRPr lang="en-US" sz="2400" dirty="0" err="1" smtClean="0">
+            <a:endParaRPr lang="en-US" sz="2400" dirty="0" err="1">
               <a:gradFill>
                 <a:gsLst>
                   <a:gs pos="0">
@@ -9417,15 +9329,7 @@
           <a:p>
             <a:r>
               <a:rPr lang="en-US" dirty="0"/>
-              <a:t>Click to edit Master </a:t>
-            </a:r>
-            <a:r>
-              <a:rPr lang="en-US" dirty="0" smtClean="0"/>
-              <a:t>subtitle </a:t>
-            </a:r>
-            <a:r>
-              <a:rPr lang="en-US" dirty="0"/>
-              <a:t>style</a:t>
+              <a:t>Click to edit Master subtitle style</a:t>
             </a:r>
           </a:p>
         </p:txBody>
@@ -9467,7 +9371,7 @@
             <a:fld id="{1C2D31DE-C454-491C-B5C3-F097855E3DF7}" type="datetime4">
               <a:rPr lang="en-US" smtClean="0"/>
               <a:pPr/>
-              <a:t>April 13, 2020</a:t>
+              <a:t>August 25, 2021</a:t>
             </a:fld>
             <a:endParaRPr lang="en-US" dirty="0"/>
           </a:p>
@@ -12541,17 +12445,16 @@
           <a:p>
             <a:pPr lvl="0"/>
             <a:r>
-              <a:rPr lang="en-US" dirty="0" smtClean="0"/>
+              <a:rPr lang="en-US" dirty="0"/>
               <a:t>Presenter Name</a:t>
             </a:r>
             <a:br>
-              <a:rPr lang="en-US" dirty="0" smtClean="0"/>
+              <a:rPr lang="en-US" dirty="0"/>
             </a:br>
             <a:r>
-              <a:rPr lang="en-US" dirty="0" smtClean="0"/>
+              <a:rPr lang="en-US" dirty="0"/>
               <a:t>Presenter Title</a:t>
             </a:r>
-            <a:endParaRPr lang="en-US" dirty="0"/>
           </a:p>
         </p:txBody>
       </p:sp>
@@ -12568,13 +12471,6 @@
   <p:transition>
     <p:fade/>
   </p:transition>
-  <p:timing>
-    <p:tnLst>
-      <p:par>
-        <p:cTn id="1" dur="indefinite" restart="never" nodeType="tmRoot"/>
-      </p:par>
-    </p:tnLst>
-  </p:timing>
   <p:hf sldNum="0" hdr="0" ftr="0"/>
 </p:sldLayout>
 </file>
@@ -12627,7 +12523,7 @@
           <a:p>
             <a:fld id="{5958763E-B898-436D-883D-03711491D54A}" type="datetimeFigureOut">
               <a:rPr lang="en-US" smtClean="0"/>
-              <a:t>4/13/2020</a:t>
+              <a:t>8/25/2021</a:t>
             </a:fld>
             <a:endParaRPr lang="en-US"/>
           </a:p>
@@ -12700,13 +12596,6 @@
   <p:transition>
     <p:fade/>
   </p:transition>
-  <p:timing>
-    <p:tnLst>
-      <p:par>
-        <p:cTn id="1" dur="indefinite" restart="never" nodeType="tmRoot"/>
-      </p:par>
-    </p:tnLst>
-  </p:timing>
 </p:sldLayout>
 </file>
 
@@ -12758,7 +12647,7 @@
           <a:p>
             <a:fld id="{5958763E-B898-436D-883D-03711491D54A}" type="datetimeFigureOut">
               <a:rPr lang="en-US" smtClean="0"/>
-              <a:t>4/13/2020</a:t>
+              <a:t>8/25/2021</a:t>
             </a:fld>
             <a:endParaRPr lang="en-US"/>
           </a:p>
@@ -12831,13 +12720,6 @@
   <p:transition>
     <p:fade/>
   </p:transition>
-  <p:timing>
-    <p:tnLst>
-      <p:par>
-        <p:cTn id="1" dur="indefinite" restart="never" nodeType="tmRoot"/>
-      </p:par>
-    </p:tnLst>
-  </p:timing>
 </p:sldLayout>
 </file>
 
@@ -12889,7 +12771,7 @@
           <a:p>
             <a:fld id="{5958763E-B898-436D-883D-03711491D54A}" type="datetimeFigureOut">
               <a:rPr lang="en-US" smtClean="0"/>
-              <a:t>4/13/2020</a:t>
+              <a:t>8/25/2021</a:t>
             </a:fld>
             <a:endParaRPr lang="en-US"/>
           </a:p>
@@ -12962,13 +12844,6 @@
   <p:transition>
     <p:fade/>
   </p:transition>
-  <p:timing>
-    <p:tnLst>
-      <p:par>
-        <p:cTn id="1" dur="indefinite" restart="never" nodeType="tmRoot"/>
-      </p:par>
-    </p:tnLst>
-  </p:timing>
 </p:sldLayout>
 </file>
 
@@ -13020,7 +12895,7 @@
           <a:p>
             <a:fld id="{5958763E-B898-436D-883D-03711491D54A}" type="datetimeFigureOut">
               <a:rPr lang="en-US" smtClean="0"/>
-              <a:t>4/13/2020</a:t>
+              <a:t>8/25/2021</a:t>
             </a:fld>
             <a:endParaRPr lang="en-US"/>
           </a:p>
@@ -13093,13 +12968,6 @@
   <p:transition>
     <p:fade/>
   </p:transition>
-  <p:timing>
-    <p:tnLst>
-      <p:par>
-        <p:cTn id="1" dur="indefinite" restart="never" nodeType="tmRoot"/>
-      </p:par>
-    </p:tnLst>
-  </p:timing>
 </p:sldLayout>
 </file>
 
@@ -13151,7 +13019,7 @@
           <a:p>
             <a:fld id="{5958763E-B898-436D-883D-03711491D54A}" type="datetimeFigureOut">
               <a:rPr lang="en-US" smtClean="0"/>
-              <a:t>4/13/2020</a:t>
+              <a:t>8/25/2021</a:t>
             </a:fld>
             <a:endParaRPr lang="en-US"/>
           </a:p>
@@ -13224,13 +13092,6 @@
   <p:transition>
     <p:fade/>
   </p:transition>
-  <p:timing>
-    <p:tnLst>
-      <p:par>
-        <p:cTn id="1" dur="indefinite" restart="never" nodeType="tmRoot"/>
-      </p:par>
-    </p:tnLst>
-  </p:timing>
 </p:sldLayout>
 </file>
 
@@ -13282,7 +13143,7 @@
           <a:p>
             <a:fld id="{5958763E-B898-436D-883D-03711491D54A}" type="datetimeFigureOut">
               <a:rPr lang="en-US" smtClean="0"/>
-              <a:t>4/13/2020</a:t>
+              <a:t>8/25/2021</a:t>
             </a:fld>
             <a:endParaRPr lang="en-US"/>
           </a:p>
@@ -13355,13 +13216,6 @@
   <p:transition>
     <p:fade/>
   </p:transition>
-  <p:timing>
-    <p:tnLst>
-      <p:par>
-        <p:cTn id="1" dur="indefinite" restart="never" nodeType="tmRoot"/>
-      </p:par>
-    </p:tnLst>
-  </p:timing>
 </p:sldLayout>
 </file>
 
@@ -13413,7 +13267,7 @@
           <a:p>
             <a:fld id="{5958763E-B898-436D-883D-03711491D54A}" type="datetimeFigureOut">
               <a:rPr lang="en-US" smtClean="0"/>
-              <a:t>4/13/2020</a:t>
+              <a:t>8/25/2021</a:t>
             </a:fld>
             <a:endParaRPr lang="en-US"/>
           </a:p>
@@ -13486,13 +13340,6 @@
   <p:transition>
     <p:fade/>
   </p:transition>
-  <p:timing>
-    <p:tnLst>
-      <p:par>
-        <p:cTn id="1" dur="indefinite" restart="never" nodeType="tmRoot"/>
-      </p:par>
-    </p:tnLst>
-  </p:timing>
 </p:sldLayout>
 </file>
 
@@ -13544,7 +13391,7 @@
           <a:p>
             <a:fld id="{5958763E-B898-436D-883D-03711491D54A}" type="datetimeFigureOut">
               <a:rPr lang="en-US" smtClean="0"/>
-              <a:t>4/13/2020</a:t>
+              <a:t>8/25/2021</a:t>
             </a:fld>
             <a:endParaRPr lang="en-US"/>
           </a:p>
@@ -13617,13 +13464,6 @@
   <p:transition>
     <p:fade/>
   </p:transition>
-  <p:timing>
-    <p:tnLst>
-      <p:par>
-        <p:cTn id="1" dur="indefinite" restart="never" nodeType="tmRoot"/>
-      </p:par>
-    </p:tnLst>
-  </p:timing>
 </p:sldLayout>
 </file>
 
@@ -13684,7 +13524,7 @@
           <a:p>
             <a:fld id="{5958763E-B898-436D-883D-03711491D54A}" type="datetimeFigureOut">
               <a:rPr lang="en-US" smtClean="0"/>
-              <a:t>4/13/2020</a:t>
+              <a:t>8/25/2021</a:t>
             </a:fld>
             <a:endParaRPr lang="en-US"/>
           </a:p>
@@ -13757,13 +13597,6 @@
   <p:transition>
     <p:fade/>
   </p:transition>
-  <p:timing>
-    <p:tnLst>
-      <p:par>
-        <p:cTn id="1" dur="indefinite" restart="never" nodeType="tmRoot"/>
-      </p:par>
-    </p:tnLst>
-  </p:timing>
 </p:sldLayout>
 </file>
 
@@ -16765,13 +16598,6 @@
   <p:transition>
     <p:fade/>
   </p:transition>
-  <p:timing>
-    <p:tnLst>
-      <p:par>
-        <p:cTn id="1" dur="indefinite" restart="never" nodeType="tmRoot"/>
-      </p:par>
-    </p:tnLst>
-  </p:timing>
 </p:sldLayout>
 </file>
 
@@ -16859,7 +16685,7 @@
                 <a:spcPct val="0"/>
               </a:spcAft>
             </a:pPr>
-            <a:endParaRPr lang="en-US" sz="2400" dirty="0" err="1" smtClean="0">
+            <a:endParaRPr lang="en-US" sz="2400" dirty="0" err="1">
               <a:gradFill>
                 <a:gsLst>
                   <a:gs pos="0">
@@ -16995,15 +16821,7 @@
           <a:p>
             <a:r>
               <a:rPr lang="en-US" dirty="0"/>
-              <a:t>Click to edit Master </a:t>
-            </a:r>
-            <a:r>
-              <a:rPr lang="en-US" dirty="0" smtClean="0"/>
-              <a:t>subtitle </a:t>
-            </a:r>
-            <a:r>
-              <a:rPr lang="en-US" dirty="0"/>
-              <a:t>style</a:t>
+              <a:t>Click to edit Master subtitle style</a:t>
             </a:r>
           </a:p>
         </p:txBody>
@@ -17045,7 +16863,7 @@
             <a:fld id="{1C2D31DE-C454-491C-B5C3-F097855E3DF7}" type="datetime4">
               <a:rPr lang="en-US" smtClean="0"/>
               <a:pPr/>
-              <a:t>April 13, 2020</a:t>
+              <a:t>August 25, 2021</a:t>
             </a:fld>
             <a:endParaRPr lang="en-US" dirty="0"/>
           </a:p>
@@ -20127,17 +19945,16 @@
           <a:p>
             <a:pPr lvl="0"/>
             <a:r>
-              <a:rPr lang="en-US" dirty="0" smtClean="0"/>
+              <a:rPr lang="en-US" dirty="0"/>
               <a:t>Presenter Name</a:t>
             </a:r>
             <a:br>
-              <a:rPr lang="en-US" dirty="0" smtClean="0"/>
+              <a:rPr lang="en-US" dirty="0"/>
             </a:br>
             <a:r>
-              <a:rPr lang="en-US" dirty="0" smtClean="0"/>
+              <a:rPr lang="en-US" dirty="0"/>
               <a:t>Presenter Title</a:t>
             </a:r>
-            <a:endParaRPr lang="en-US" dirty="0"/>
           </a:p>
         </p:txBody>
       </p:sp>
@@ -20154,13 +19971,6 @@
   <p:transition>
     <p:fade/>
   </p:transition>
-  <p:timing>
-    <p:tnLst>
-      <p:par>
-        <p:cTn id="1" dur="indefinite" restart="never" nodeType="tmRoot"/>
-      </p:par>
-    </p:tnLst>
-  </p:timing>
   <p:hf sldNum="0" hdr="0" ftr="0"/>
 </p:sldLayout>
 </file>
@@ -27670,10 +27480,9 @@
           <a:p>
             <a:pPr lvl="0"/>
             <a:r>
-              <a:rPr lang="en-US" dirty="0" smtClean="0"/>
+              <a:rPr lang="en-US" dirty="0"/>
               <a:t>&lt;Call to action&gt;</a:t>
             </a:r>
-            <a:endParaRPr lang="en-US" dirty="0"/>
           </a:p>
         </p:txBody>
       </p:sp>
@@ -29290,7 +29099,7 @@
           <a:p>
             <a:fld id="{5958763E-B898-436D-883D-03711491D54A}" type="datetimeFigureOut">
               <a:rPr lang="en-US" smtClean="0"/>
-              <a:t>4/13/2020</a:t>
+              <a:t>8/25/2021</a:t>
             </a:fld>
             <a:endParaRPr lang="en-US"/>
           </a:p>
@@ -29417,7 +29226,7 @@
                 <a:spcPct val="0"/>
               </a:spcAft>
             </a:pPr>
-            <a:endParaRPr lang="en-US" sz="2400" dirty="0" err="1" smtClean="0">
+            <a:endParaRPr lang="en-US" sz="2400" dirty="0" err="1">
               <a:gradFill>
                 <a:gsLst>
                   <a:gs pos="0">
@@ -29448,13 +29257,6 @@
   <p:transition>
     <p:fade/>
   </p:transition>
-  <p:timing>
-    <p:tnLst>
-      <p:par>
-        <p:cTn id="1" dur="indefinite" restart="never" nodeType="tmRoot"/>
-      </p:par>
-    </p:tnLst>
-  </p:timing>
 </p:sldLayout>
 </file>
 
@@ -29699,7 +29501,7 @@
           <a:p>
             <a:fld id="{5958763E-B898-436D-883D-03711491D54A}" type="datetimeFigureOut">
               <a:rPr lang="en-US" smtClean="0"/>
-              <a:t>4/13/2020</a:t>
+              <a:t>8/25/2021</a:t>
             </a:fld>
             <a:endParaRPr lang="en-US"/>
           </a:p>
@@ -29772,13 +29574,6 @@
   <p:transition>
     <p:fade/>
   </p:transition>
-  <p:timing>
-    <p:tnLst>
-      <p:par>
-        <p:cTn id="1" dur="indefinite" restart="never" nodeType="tmRoot"/>
-      </p:par>
-    </p:tnLst>
-  </p:timing>
 </p:sldLayout>
 </file>
 
@@ -30000,7 +29795,7 @@
           <a:p>
             <a:fld id="{5958763E-B898-436D-883D-03711491D54A}" type="datetimeFigureOut">
               <a:rPr lang="en-US" smtClean="0"/>
-              <a:t>4/13/2020</a:t>
+              <a:t>8/25/2021</a:t>
             </a:fld>
             <a:endParaRPr lang="en-US"/>
           </a:p>
@@ -30073,13 +29868,6 @@
   <p:transition>
     <p:fade/>
   </p:transition>
-  <p:timing>
-    <p:tnLst>
-      <p:par>
-        <p:cTn id="1" dur="indefinite" restart="never" nodeType="tmRoot"/>
-      </p:par>
-    </p:tnLst>
-  </p:timing>
 </p:sldLayout>
 </file>
 
@@ -30208,7 +29996,7 @@
           <a:p>
             <a:fld id="{5958763E-B898-436D-883D-03711491D54A}" type="datetimeFigureOut">
               <a:rPr lang="en-US" smtClean="0"/>
-              <a:t>4/13/2020</a:t>
+              <a:t>8/25/2021</a:t>
             </a:fld>
             <a:endParaRPr lang="en-US"/>
           </a:p>
@@ -30331,13 +30119,6 @@
   <p:transition>
     <p:fade/>
   </p:transition>
-  <p:timing>
-    <p:tnLst>
-      <p:par>
-        <p:cTn id="1" dur="indefinite" restart="never" nodeType="tmRoot"/>
-      </p:par>
-    </p:tnLst>
-  </p:timing>
 </p:sldLayout>
 </file>
 
@@ -30476,7 +30257,7 @@
           <a:p>
             <a:fld id="{5958763E-B898-436D-883D-03711491D54A}" type="datetimeFigureOut">
               <a:rPr lang="en-US" smtClean="0"/>
-              <a:t>4/13/2020</a:t>
+              <a:t>8/25/2021</a:t>
             </a:fld>
             <a:endParaRPr lang="en-US"/>
           </a:p>
@@ -30603,13 +30384,6 @@
   <p:transition>
     <p:fade/>
   </p:transition>
-  <p:timing>
-    <p:tnLst>
-      <p:par>
-        <p:cTn id="1" dur="indefinite" restart="never" nodeType="tmRoot"/>
-      </p:par>
-    </p:tnLst>
-  </p:timing>
 </p:sldLayout>
 </file>
 
@@ -30771,7 +30545,7 @@
                 <a:spcPct val="0"/>
               </a:spcAft>
             </a:pPr>
-            <a:endParaRPr lang="en-US" sz="2400" dirty="0" err="1" smtClean="0">
+            <a:endParaRPr lang="en-US" sz="2400" dirty="0" err="1">
               <a:gradFill>
                 <a:gsLst>
                   <a:gs pos="0">
@@ -30822,10 +30596,9 @@
           </a:lstStyle>
           <a:p>
             <a:r>
-              <a:rPr lang="en-US" dirty="0" smtClean="0"/>
+              <a:rPr lang="en-US" dirty="0"/>
               <a:t>Type “Agenda”</a:t>
             </a:r>
-            <a:endParaRPr lang="en-US" dirty="0"/>
           </a:p>
         </p:txBody>
       </p:sp>
@@ -30949,24 +30722,23 @@
           <a:p>
             <a:pPr lvl="0"/>
             <a:r>
-              <a:rPr lang="en-US" dirty="0" smtClean="0"/>
+              <a:rPr lang="en-US" dirty="0"/>
               <a:t>Item 1</a:t>
             </a:r>
           </a:p>
           <a:p>
             <a:pPr lvl="0"/>
             <a:r>
-              <a:rPr lang="en-US" dirty="0" smtClean="0"/>
+              <a:rPr lang="en-US" dirty="0"/>
               <a:t>Item 2</a:t>
             </a:r>
           </a:p>
           <a:p>
             <a:pPr lvl="0"/>
             <a:r>
-              <a:rPr lang="en-US" dirty="0" smtClean="0"/>
+              <a:rPr lang="en-US" dirty="0"/>
               <a:t>Item 3</a:t>
             </a:r>
-            <a:endParaRPr lang="en-US" dirty="0"/>
           </a:p>
         </p:txBody>
       </p:sp>
@@ -30993,7 +30765,7 @@
           <a:p>
             <a:fld id="{5958763E-B898-436D-883D-03711491D54A}" type="datetimeFigureOut">
               <a:rPr lang="en-US" smtClean="0"/>
-              <a:t>4/13/2020</a:t>
+              <a:t>8/25/2021</a:t>
             </a:fld>
             <a:endParaRPr lang="en-US"/>
           </a:p>
@@ -31100,13 +30872,6 @@
   <p:transition>
     <p:fade/>
   </p:transition>
-  <p:timing>
-    <p:tnLst>
-      <p:par>
-        <p:cTn id="1" dur="indefinite" restart="never" nodeType="tmRoot"/>
-      </p:par>
-    </p:tnLst>
-  </p:timing>
 </p:sldLayout>
 </file>
 
@@ -31268,7 +31033,7 @@
                 <a:spcPct val="0"/>
               </a:spcAft>
             </a:pPr>
-            <a:endParaRPr lang="en-US" sz="2400" dirty="0" err="1" smtClean="0">
+            <a:endParaRPr lang="en-US" sz="2400" dirty="0" err="1">
               <a:gradFill>
                 <a:gsLst>
                   <a:gs pos="0">
@@ -31321,10 +31086,9 @@
           </a:lstStyle>
           <a:p>
             <a:r>
-              <a:rPr lang="en-US" dirty="0" smtClean="0"/>
+              <a:rPr lang="en-US" dirty="0"/>
               <a:t>Notable Quote</a:t>
             </a:r>
-            <a:endParaRPr lang="en-US" dirty="0"/>
           </a:p>
         </p:txBody>
       </p:sp>
@@ -31451,10 +31215,9 @@
           <a:p>
             <a:pPr lvl="0"/>
             <a:r>
-              <a:rPr lang="en-US" dirty="0" smtClean="0"/>
+              <a:rPr lang="en-US" dirty="0"/>
               <a:t>– Attribution</a:t>
             </a:r>
-            <a:endParaRPr lang="en-US" dirty="0"/>
           </a:p>
         </p:txBody>
       </p:sp>
@@ -31481,7 +31244,7 @@
           <a:p>
             <a:fld id="{5958763E-B898-436D-883D-03711491D54A}" type="datetimeFigureOut">
               <a:rPr lang="en-US" smtClean="0"/>
-              <a:t>4/13/2020</a:t>
+              <a:t>8/25/2021</a:t>
             </a:fld>
             <a:endParaRPr lang="en-US"/>
           </a:p>
@@ -32229,13 +31992,6 @@
   <p:transition>
     <p:fade/>
   </p:transition>
-  <p:timing>
-    <p:tnLst>
-      <p:par>
-        <p:cTn id="1" dur="indefinite" restart="never" nodeType="tmRoot"/>
-      </p:par>
-    </p:tnLst>
-  </p:timing>
 </p:sldLayout>
 </file>
 
@@ -32307,7 +32063,7 @@
           <a:p>
             <a:fld id="{5958763E-B898-436D-883D-03711491D54A}" type="datetimeFigureOut">
               <a:rPr lang="en-US" smtClean="0"/>
-              <a:t>4/13/2020</a:t>
+              <a:t>8/25/2021</a:t>
             </a:fld>
             <a:endParaRPr lang="en-US"/>
           </a:p>
@@ -32380,13 +32136,6 @@
   <p:transition>
     <p:fade/>
   </p:transition>
-  <p:timing>
-    <p:tnLst>
-      <p:par>
-        <p:cTn id="1" dur="indefinite" restart="never" nodeType="tmRoot"/>
-      </p:par>
-    </p:tnLst>
-  </p:timing>
 </p:sldLayout>
 </file>
 
@@ -32515,7 +32264,7 @@
           <a:p>
             <a:fld id="{5958763E-B898-436D-883D-03711491D54A}" type="datetimeFigureOut">
               <a:rPr lang="en-US" smtClean="0"/>
-              <a:t>4/13/2020</a:t>
+              <a:t>8/25/2021</a:t>
             </a:fld>
             <a:endParaRPr lang="en-US"/>
           </a:p>
@@ -32638,13 +32387,6 @@
   <p:transition>
     <p:fade/>
   </p:transition>
-  <p:timing>
-    <p:tnLst>
-      <p:par>
-        <p:cTn id="1" dur="indefinite" restart="never" nodeType="tmRoot"/>
-      </p:par>
-    </p:tnLst>
-  </p:timing>
 </p:sldLayout>
 </file>
 
@@ -32857,7 +32599,7 @@
           <a:p>
             <a:fld id="{5958763E-B898-436D-883D-03711491D54A}" type="datetimeFigureOut">
               <a:rPr lang="en-US" smtClean="0"/>
-              <a:t>4/13/2020</a:t>
+              <a:t>8/25/2021</a:t>
             </a:fld>
             <a:endParaRPr lang="en-US"/>
           </a:p>
@@ -32930,13 +32672,6 @@
   <p:transition>
     <p:fade/>
   </p:transition>
-  <p:timing>
-    <p:tnLst>
-      <p:par>
-        <p:cTn id="1" dur="indefinite" restart="never" nodeType="tmRoot"/>
-      </p:par>
-    </p:tnLst>
-  </p:timing>
 </p:sldLayout>
 </file>
 
@@ -33094,7 +32829,7 @@
           <a:p>
             <a:fld id="{5958763E-B898-436D-883D-03711491D54A}" type="datetimeFigureOut">
               <a:rPr lang="en-US" smtClean="0"/>
-              <a:t>4/13/2020</a:t>
+              <a:t>8/25/2021</a:t>
             </a:fld>
             <a:endParaRPr lang="en-US"/>
           </a:p>
@@ -33167,13 +32902,6 @@
   <p:transition>
     <p:fade/>
   </p:transition>
-  <p:timing>
-    <p:tnLst>
-      <p:par>
-        <p:cTn id="1" dur="indefinite" restart="never" nodeType="tmRoot"/>
-      </p:par>
-    </p:tnLst>
-  </p:timing>
 </p:sldLayout>
 </file>
 
@@ -33345,7 +33073,7 @@
           <a:p>
             <a:fld id="{5958763E-B898-436D-883D-03711491D54A}" type="datetimeFigureOut">
               <a:rPr lang="en-US" smtClean="0"/>
-              <a:t>4/13/2020</a:t>
+              <a:t>8/25/2021</a:t>
             </a:fld>
             <a:endParaRPr lang="en-US"/>
           </a:p>
@@ -33491,13 +33219,6 @@
   <p:transition>
     <p:fade/>
   </p:transition>
-  <p:timing>
-    <p:tnLst>
-      <p:par>
-        <p:cTn id="1" dur="indefinite" restart="never" nodeType="tmRoot"/>
-      </p:par>
-    </p:tnLst>
-  </p:timing>
   <p:txStyles>
     <p:titleStyle>
       <a:lvl1pPr algn="l" defTabSz="914400" rtl="0" eaLnBrk="1" latinLnBrk="0" hangingPunct="1">
@@ -33802,7 +33523,7 @@
       </a:lvl9pPr>
     </p:otherStyle>
   </p:txStyles>
-  <p:extLst mod="1">
+  <p:extLst>
     <p:ext uri="{27BBF7A9-308A-43DC-89C8-2F10F3537804}">
       <p15:sldGuideLst xmlns:p15="http://schemas.microsoft.com/office/powerpoint/2012/main">
         <p15:guide id="1" orient="horz" pos="2160" userDrawn="1">
@@ -33881,10 +33602,9 @@
           <a:lstStyle/>
           <a:p>
             <a:r>
-              <a:rPr lang="en-US" sz="6600" dirty="0" smtClean="0"/>
+              <a:rPr lang="en-US" sz="6600" dirty="0"/>
               <a:t>JavaScript Objects</a:t>
             </a:r>
-            <a:endParaRPr lang="en-US" sz="6600" dirty="0"/>
           </a:p>
         </p:txBody>
       </p:sp>
@@ -33909,11 +33629,11 @@
           <a:lstStyle/>
           <a:p>
             <a:r>
-              <a:rPr lang="en-US" dirty="0" smtClean="0"/>
+              <a:rPr lang="en-US" dirty="0"/>
               <a:t>Hy-Tech Club: </a:t>
             </a:r>
             <a:r>
-              <a:rPr lang="en-US" smtClean="0"/>
+              <a:rPr lang="en-US"/>
               <a:t>Web 102</a:t>
             </a:r>
             <a:endParaRPr lang="en-US" dirty="0"/>
@@ -36901,13 +36621,6 @@
   <p:transition>
     <p:fade/>
   </p:transition>
-  <p:timing>
-    <p:tnLst>
-      <p:par>
-        <p:cTn id="1" dur="indefinite" restart="never" nodeType="tmRoot"/>
-      </p:par>
-    </p:tnLst>
-  </p:timing>
 </p:sld>
 </file>
 
@@ -36944,10 +36657,9 @@
           <a:lstStyle/>
           <a:p>
             <a:r>
-              <a:rPr lang="en-US" dirty="0" smtClean="0"/>
+              <a:rPr lang="en-US" dirty="0"/>
               <a:t>Mini-quiz</a:t>
             </a:r>
-            <a:endParaRPr lang="en-US" dirty="0"/>
           </a:p>
         </p:txBody>
       </p:sp>
@@ -37197,7 +36909,7 @@
               <a:buNone/>
             </a:pPr>
             <a:r>
-              <a:rPr lang="en-US" sz="3600" dirty="0" smtClean="0">
+              <a:rPr lang="en-US" sz="3600" dirty="0">
                 <a:solidFill>
                   <a:srgbClr val="000000"/>
                 </a:solidFill>
@@ -37205,12 +36917,6 @@
               </a:rPr>
               <a:t>}</a:t>
             </a:r>
-            <a:endParaRPr lang="en-US" sz="3600" dirty="0">
-              <a:solidFill>
-                <a:srgbClr val="000000"/>
-              </a:solidFill>
-              <a:latin typeface="Consolas" panose="020B0609020204030204" pitchFamily="49" charset="0"/>
-            </a:endParaRPr>
           </a:p>
         </p:txBody>
       </p:sp>
@@ -37245,7 +36951,7 @@
               </a:buClr>
             </a:pPr>
             <a:r>
-              <a:rPr lang="en-US" sz="4400" dirty="0" err="1" smtClean="0">
+              <a:rPr lang="en-US" sz="4400" dirty="0" err="1">
                 <a:solidFill>
                   <a:schemeClr val="accent5">
                     <a:lumMod val="10000"/>
@@ -37320,13 +37026,6 @@
   <p:transition>
     <p:fade/>
   </p:transition>
-  <p:timing>
-    <p:tnLst>
-      <p:par>
-        <p:cTn id="1" dur="indefinite" restart="never" nodeType="tmRoot"/>
-      </p:par>
-    </p:tnLst>
-  </p:timing>
 </p:sld>
 </file>
 
@@ -37363,10 +37062,9 @@
           <a:lstStyle/>
           <a:p>
             <a:r>
-              <a:rPr lang="en-US" dirty="0" smtClean="0"/>
+              <a:rPr lang="en-US" dirty="0"/>
               <a:t>Mini-quiz</a:t>
             </a:r>
-            <a:endParaRPr lang="en-US" dirty="0"/>
           </a:p>
         </p:txBody>
       </p:sp>
@@ -37616,7 +37314,7 @@
               <a:buNone/>
             </a:pPr>
             <a:r>
-              <a:rPr lang="en-US" sz="3600" dirty="0" smtClean="0">
+              <a:rPr lang="en-US" sz="3600" dirty="0">
                 <a:solidFill>
                   <a:srgbClr val="000000"/>
                 </a:solidFill>
@@ -37624,12 +37322,6 @@
               </a:rPr>
               <a:t>}</a:t>
             </a:r>
-            <a:endParaRPr lang="en-US" sz="3600" dirty="0">
-              <a:solidFill>
-                <a:srgbClr val="000000"/>
-              </a:solidFill>
-              <a:latin typeface="Consolas" panose="020B0609020204030204" pitchFamily="49" charset="0"/>
-            </a:endParaRPr>
           </a:p>
         </p:txBody>
       </p:sp>
@@ -37672,7 +37364,7 @@
               <a:t>How would you </a:t>
             </a:r>
             <a:r>
-              <a:rPr lang="en-US" sz="2800" i="1" dirty="0" smtClean="0">
+              <a:rPr lang="en-US" sz="2800" i="1" dirty="0">
                 <a:solidFill>
                   <a:srgbClr val="56565A"/>
                 </a:solidFill>
@@ -37680,34 +37372,13 @@
               <a:t>set</a:t>
             </a:r>
             <a:r>
-              <a:rPr lang="en-US" sz="2800" dirty="0" smtClean="0">
-                <a:solidFill>
-                  <a:srgbClr val="56565A"/>
-                </a:solidFill>
-              </a:rPr>
-              <a:t> </a:t>
-            </a:r>
-            <a:r>
               <a:rPr lang="en-US" sz="2800" dirty="0">
                 <a:solidFill>
                   <a:srgbClr val="56565A"/>
                 </a:solidFill>
               </a:rPr>
-              <a:t>the </a:t>
-            </a:r>
-            <a:r>
-              <a:rPr lang="en-US" sz="2800" dirty="0" smtClean="0">
-                <a:solidFill>
-                  <a:srgbClr val="56565A"/>
-                </a:solidFill>
-              </a:rPr>
-              <a:t>flight time to 250?</a:t>
-            </a:r>
-            <a:endParaRPr lang="en-US" sz="2800" dirty="0">
-              <a:solidFill>
-                <a:srgbClr val="56565A"/>
-              </a:solidFill>
-            </a:endParaRPr>
+              <a:t> the flight time to 250?</a:t>
+            </a:r>
           </a:p>
         </p:txBody>
       </p:sp>
@@ -37765,13 +37436,6 @@
   <p:transition>
     <p:fade/>
   </p:transition>
-  <p:timing>
-    <p:tnLst>
-      <p:par>
-        <p:cTn id="1" dur="indefinite" restart="never" nodeType="tmRoot"/>
-      </p:par>
-    </p:tnLst>
-  </p:timing>
 </p:sld>
 </file>
 
@@ -37808,10 +37472,9 @@
           <a:lstStyle/>
           <a:p>
             <a:r>
-              <a:rPr lang="en-US" dirty="0" smtClean="0"/>
+              <a:rPr lang="en-US" dirty="0"/>
               <a:t>Mini-quiz</a:t>
             </a:r>
-            <a:endParaRPr lang="en-US" dirty="0"/>
           </a:p>
         </p:txBody>
       </p:sp>
@@ -38061,7 +37724,7 @@
               <a:buNone/>
             </a:pPr>
             <a:r>
-              <a:rPr lang="en-US" sz="3600" dirty="0" smtClean="0">
+              <a:rPr lang="en-US" sz="3600" dirty="0">
                 <a:solidFill>
                   <a:srgbClr val="000000"/>
                 </a:solidFill>
@@ -38069,12 +37732,6 @@
               </a:rPr>
               <a:t>}</a:t>
             </a:r>
-            <a:endParaRPr lang="en-US" sz="3600" dirty="0">
-              <a:solidFill>
-                <a:srgbClr val="000000"/>
-              </a:solidFill>
-              <a:latin typeface="Consolas" panose="020B0609020204030204" pitchFamily="49" charset="0"/>
-            </a:endParaRPr>
           </a:p>
         </p:txBody>
       </p:sp>
@@ -38109,7 +37766,7 @@
               </a:buClr>
             </a:pPr>
             <a:r>
-              <a:rPr lang="en-US" sz="4400" dirty="0" err="1" smtClean="0">
+              <a:rPr lang="en-US" sz="4400" dirty="0" err="1">
                 <a:solidFill>
                   <a:schemeClr val="accent5">
                     <a:lumMod val="10000"/>
@@ -38120,7 +37777,7 @@
               <a:t>flight.FlightTime</a:t>
             </a:r>
             <a:r>
-              <a:rPr lang="en-US" sz="4400" dirty="0" smtClean="0">
+              <a:rPr lang="en-US" sz="4400" dirty="0">
                 <a:solidFill>
                   <a:schemeClr val="accent5">
                     <a:lumMod val="10000"/>
@@ -38131,7 +37788,7 @@
               <a:t> = </a:t>
             </a:r>
             <a:r>
-              <a:rPr lang="en-US" sz="4400" dirty="0" smtClean="0">
+              <a:rPr lang="en-US" sz="4400" dirty="0">
                 <a:solidFill>
                   <a:srgbClr val="09885A"/>
                 </a:solidFill>
@@ -38204,13 +37861,6 @@
   <p:transition>
     <p:fade/>
   </p:transition>
-  <p:timing>
-    <p:tnLst>
-      <p:par>
-        <p:cTn id="1" dur="indefinite" restart="never" nodeType="tmRoot"/>
-      </p:par>
-    </p:tnLst>
-  </p:timing>
 </p:sld>
 </file>
 
@@ -38247,10 +37897,9 @@
           <a:lstStyle/>
           <a:p>
             <a:r>
-              <a:rPr lang="en-US" dirty="0" smtClean="0"/>
+              <a:rPr lang="en-US" dirty="0"/>
               <a:t>Mini-quiz</a:t>
             </a:r>
-            <a:endParaRPr lang="en-US" dirty="0"/>
           </a:p>
         </p:txBody>
       </p:sp>
@@ -38278,11 +37927,11 @@
               <a:buNone/>
             </a:pPr>
             <a:r>
-              <a:rPr lang="en-US" sz="4400" dirty="0" smtClean="0"/>
+              <a:rPr lang="en-US" sz="4400" dirty="0"/>
               <a:t>Define a new object variable named </a:t>
             </a:r>
             <a:r>
-              <a:rPr lang="en-US" sz="4400" dirty="0" smtClean="0">
+              <a:rPr lang="en-US" sz="4400" dirty="0">
                 <a:solidFill>
                   <a:srgbClr val="000000"/>
                 </a:solidFill>
@@ -38291,7 +37940,7 @@
               <a:t>dog</a:t>
             </a:r>
             <a:r>
-              <a:rPr lang="en-US" sz="4400" dirty="0" smtClean="0"/>
+              <a:rPr lang="en-US" sz="4400" dirty="0"/>
               <a:t> with:</a:t>
             </a:r>
           </a:p>
@@ -38299,34 +37948,18 @@
             <a:pPr marL="57150" indent="0">
               <a:buNone/>
             </a:pPr>
-            <a:endParaRPr lang="en-US" sz="4400" dirty="0" smtClean="0"/>
-          </a:p>
-          <a:p>
-            <a:r>
-              <a:rPr lang="en-US" sz="4400" dirty="0" smtClean="0"/>
-              <a:t>a </a:t>
-            </a:r>
+            <a:endParaRPr lang="en-US" sz="4400" dirty="0"/>
+          </a:p>
+          <a:p>
             <a:r>
               <a:rPr lang="en-US" sz="4400" dirty="0"/>
-              <a:t>name of “Air Bud</a:t>
-            </a:r>
-            <a:r>
-              <a:rPr lang="en-US" sz="4400" dirty="0" smtClean="0"/>
-              <a:t>”</a:t>
-            </a:r>
-          </a:p>
-          <a:p>
-            <a:r>
-              <a:rPr lang="en-US" sz="4400" dirty="0" smtClean="0"/>
-              <a:t>a </a:t>
-            </a:r>
+              <a:t>a name of “Air Bud”</a:t>
+            </a:r>
+          </a:p>
+          <a:p>
             <a:r>
               <a:rPr lang="en-US" sz="4400" dirty="0"/>
-              <a:t>breed of “Golden Retriever</a:t>
-            </a:r>
-            <a:r>
-              <a:rPr lang="en-US" sz="4400" dirty="0" smtClean="0"/>
-              <a:t>” </a:t>
+              <a:t>a breed of “Golden Retriever” </a:t>
             </a:r>
             <a:endParaRPr lang="en-US" sz="4400" i="1" dirty="0"/>
           </a:p>
@@ -38392,13 +38025,6 @@
   <p:transition>
     <p:fade/>
   </p:transition>
-  <p:timing>
-    <p:tnLst>
-      <p:par>
-        <p:cTn id="1" dur="indefinite" restart="never" nodeType="tmRoot"/>
-      </p:par>
-    </p:tnLst>
-  </p:timing>
 </p:sld>
 </file>
 
@@ -38435,10 +38061,9 @@
           <a:lstStyle/>
           <a:p>
             <a:r>
-              <a:rPr lang="en-US" dirty="0" smtClean="0"/>
+              <a:rPr lang="en-US" dirty="0"/>
               <a:t>Mini-quiz</a:t>
             </a:r>
-            <a:endParaRPr lang="en-US" dirty="0"/>
           </a:p>
         </p:txBody>
       </p:sp>
@@ -38570,13 +38195,6 @@
   <p:transition>
     <p:fade/>
   </p:transition>
-  <p:timing>
-    <p:tnLst>
-      <p:par>
-        <p:cTn id="1" dur="indefinite" restart="never" nodeType="tmRoot"/>
-      </p:par>
-    </p:tnLst>
-  </p:timing>
 </p:sld>
 </file>
 
@@ -38613,10 +38231,9 @@
           <a:lstStyle/>
           <a:p>
             <a:r>
-              <a:rPr lang="en-US" dirty="0" smtClean="0"/>
+              <a:rPr lang="en-US" dirty="0"/>
               <a:t>Related Variables</a:t>
             </a:r>
-            <a:endParaRPr lang="en-US" dirty="0"/>
           </a:p>
         </p:txBody>
       </p:sp>
@@ -38757,7 +38374,7 @@
               <a:buNone/>
             </a:pPr>
             <a:r>
-              <a:rPr lang="en-US" sz="4400" dirty="0" err="1">
+              <a:rPr lang="en-US" sz="4400" dirty="0">
                 <a:solidFill>
                   <a:srgbClr val="0000FF"/>
                 </a:solidFill>
@@ -38799,19 +38416,10 @@
                 </a:solidFill>
                 <a:latin typeface="Consolas" panose="020B0609020204030204" pitchFamily="49" charset="0"/>
               </a:rPr>
-              <a:t>"Westlake</a:t>
-            </a:r>
-            <a:r>
-              <a:rPr lang="en-US" sz="4400" dirty="0" smtClean="0">
-                <a:solidFill>
-                  <a:srgbClr val="A31515"/>
-                </a:solidFill>
-                <a:latin typeface="Consolas" panose="020B0609020204030204" pitchFamily="49" charset="0"/>
-              </a:rPr>
-              <a:t>"</a:t>
-            </a:r>
-            <a:r>
-              <a:rPr lang="en-US" sz="4400" dirty="0" smtClean="0">
+              <a:t>"Westlake"</a:t>
+            </a:r>
+            <a:r>
+              <a:rPr lang="en-US" sz="4400" dirty="0">
                 <a:solidFill>
                   <a:srgbClr val="000000"/>
                 </a:solidFill>
@@ -38819,41 +38427,40 @@
               </a:rPr>
               <a:t>;</a:t>
             </a:r>
-            <a:endParaRPr lang="en-US" sz="4400" dirty="0" smtClean="0"/>
+            <a:endParaRPr lang="en-US" sz="4400" dirty="0"/>
           </a:p>
           <a:p>
             <a:endParaRPr lang="en-US" dirty="0"/>
           </a:p>
           <a:p>
             <a:r>
-              <a:rPr lang="en-US" dirty="0" smtClean="0"/>
+              <a:rPr lang="en-US" dirty="0"/>
               <a:t>These variables all describe the same </a:t>
             </a:r>
             <a:r>
-              <a:rPr lang="en-US" i="1" dirty="0" smtClean="0"/>
+              <a:rPr lang="en-US" i="1" dirty="0"/>
               <a:t>person</a:t>
             </a:r>
           </a:p>
           <a:p>
             <a:r>
-              <a:rPr lang="en-US" dirty="0" smtClean="0"/>
+              <a:rPr lang="en-US" dirty="0"/>
               <a:t>Currently, they are not tied together in any way…</a:t>
             </a:r>
           </a:p>
           <a:p>
             <a:r>
-              <a:rPr lang="en-US" dirty="0" smtClean="0"/>
+              <a:rPr lang="en-US" dirty="0"/>
               <a:t>It is possible to use </a:t>
             </a:r>
             <a:r>
-              <a:rPr lang="en-US" b="1" dirty="0" smtClean="0"/>
+              <a:rPr lang="en-US" b="1" dirty="0"/>
               <a:t>objects</a:t>
             </a:r>
             <a:r>
-              <a:rPr lang="en-US" dirty="0" smtClean="0"/>
+              <a:rPr lang="en-US" dirty="0"/>
               <a:t> to group them!</a:t>
             </a:r>
-            <a:endParaRPr lang="en-US" dirty="0"/>
           </a:p>
         </p:txBody>
       </p:sp>
@@ -39122,10 +38729,9 @@
           <a:lstStyle/>
           <a:p>
             <a:r>
-              <a:rPr lang="en-US" dirty="0" smtClean="0"/>
+              <a:rPr lang="en-US" dirty="0"/>
               <a:t>Initializing an object with properties</a:t>
             </a:r>
-            <a:endParaRPr lang="en-US" dirty="0"/>
           </a:p>
         </p:txBody>
       </p:sp>
@@ -39271,7 +38877,7 @@
               <a:buNone/>
             </a:pPr>
             <a:r>
-              <a:rPr lang="en-US" sz="4800" dirty="0" smtClean="0">
+              <a:rPr lang="en-US" sz="4800" dirty="0">
                 <a:solidFill>
                   <a:srgbClr val="000000"/>
                 </a:solidFill>
@@ -39279,12 +38885,6 @@
               </a:rPr>
               <a:t>}</a:t>
             </a:r>
-            <a:endParaRPr lang="en-US" sz="4800" dirty="0">
-              <a:solidFill>
-                <a:srgbClr val="000000"/>
-              </a:solidFill>
-              <a:latin typeface="Consolas" panose="020B0609020204030204" pitchFamily="49" charset="0"/>
-            </a:endParaRPr>
           </a:p>
         </p:txBody>
       </p:sp>
@@ -39319,7 +38919,7 @@
               </a:spcAft>
             </a:pPr>
             <a:r>
-              <a:rPr lang="en-US" sz="3200" dirty="0" err="1" smtClean="0">
+              <a:rPr lang="en-US" sz="3200" dirty="0" err="1">
                 <a:solidFill>
                   <a:srgbClr val="0000FF"/>
                 </a:solidFill>
@@ -39327,7 +38927,7 @@
               </a:rPr>
               <a:t>var</a:t>
             </a:r>
-            <a:endParaRPr lang="en-US" sz="3200" dirty="0" smtClean="0">
+            <a:endParaRPr lang="en-US" sz="3200" dirty="0">
               <a:solidFill>
                 <a:srgbClr val="0000FF"/>
               </a:solidFill>
@@ -39362,7 +38962,7 @@
               </a:spcAft>
             </a:pPr>
             <a:r>
-              <a:rPr lang="en-US" sz="3200" dirty="0" smtClean="0">
+              <a:rPr lang="en-US" sz="3200" dirty="0">
                 <a:solidFill>
                   <a:srgbClr val="000000"/>
                 </a:solidFill>
@@ -39419,7 +39019,7 @@
               </a:spcAft>
             </a:pPr>
             <a:r>
-              <a:rPr lang="en-US" sz="3200" dirty="0" smtClean="0">
+              <a:rPr lang="en-US" sz="3200" dirty="0">
                 <a:solidFill>
                   <a:srgbClr val="000000"/>
                 </a:solidFill>
@@ -39435,20 +39035,12 @@
                   <a:srgbClr val="FF8300"/>
                 </a:solidFill>
               </a:rPr>
-              <a:t>Property </a:t>
-            </a:r>
-            <a:r>
-              <a:rPr lang="en-US" sz="3200" dirty="0" smtClean="0">
-                <a:solidFill>
-                  <a:srgbClr val="FF8300"/>
-                </a:solidFill>
-              </a:rPr>
-              <a:t>Value</a:t>
-            </a:r>
-          </a:p>
-          <a:p>
-            <a:r>
-              <a:rPr lang="en-US" sz="3200" dirty="0" smtClean="0">
+              <a:t>Property Value</a:t>
+            </a:r>
+          </a:p>
+          <a:p>
+            <a:r>
+              <a:rPr lang="en-US" sz="3200" dirty="0">
                 <a:solidFill>
                   <a:srgbClr val="000000"/>
                 </a:solidFill>
@@ -39459,7 +39051,7 @@
           </a:p>
           <a:p>
             <a:r>
-              <a:rPr lang="en-US" sz="3200" dirty="0" smtClean="0">
+              <a:rPr lang="en-US" sz="3200" dirty="0">
                 <a:solidFill>
                   <a:schemeClr val="tx1">
                     <a:lumMod val="60000"/>
@@ -39469,18 +39061,10 @@
               </a:rPr>
               <a:t>Other Properties</a:t>
             </a:r>
-            <a:endParaRPr lang="en-US" sz="3200" dirty="0">
-              <a:solidFill>
-                <a:schemeClr val="tx1">
-                  <a:lumMod val="60000"/>
-                  <a:lumOff val="40000"/>
-                </a:schemeClr>
-              </a:solidFill>
-            </a:endParaRPr>
-          </a:p>
-          <a:p>
-            <a:r>
-              <a:rPr lang="en-US" sz="3200" dirty="0" smtClean="0">
+          </a:p>
+          <a:p>
+            <a:r>
+              <a:rPr lang="en-US" sz="3200" dirty="0">
                 <a:solidFill>
                   <a:srgbClr val="000000"/>
                 </a:solidFill>
@@ -40873,10 +40457,9 @@
           <a:lstStyle/>
           <a:p>
             <a:r>
-              <a:rPr lang="en-US" dirty="0" smtClean="0"/>
+              <a:rPr lang="en-US" dirty="0"/>
               <a:t>Accessing properties from an object</a:t>
             </a:r>
-            <a:endParaRPr lang="en-US" dirty="0"/>
           </a:p>
         </p:txBody>
       </p:sp>
@@ -40941,7 +40524,7 @@
               <a:buNone/>
             </a:pPr>
             <a:r>
-              <a:rPr lang="en-US" sz="4800" dirty="0" err="1" smtClean="0">
+              <a:rPr lang="en-US" sz="4800" dirty="0" err="1">
                 <a:solidFill>
                   <a:srgbClr val="000000"/>
                 </a:solidFill>
@@ -40949,7 +40532,7 @@
               </a:rPr>
               <a:t>person.City</a:t>
             </a:r>
-            <a:endParaRPr lang="en-US" sz="4800" dirty="0" smtClean="0">
+            <a:endParaRPr lang="en-US" sz="4800" dirty="0">
               <a:solidFill>
                 <a:srgbClr val="000000"/>
               </a:solidFill>
@@ -40964,29 +40547,29 @@
           </a:p>
           <a:p>
             <a:r>
-              <a:rPr lang="en-US" sz="3200" dirty="0" smtClean="0"/>
+              <a:rPr lang="en-US" sz="3200" dirty="0"/>
               <a:t>Use the dot notation to </a:t>
             </a:r>
             <a:r>
-              <a:rPr lang="en-US" sz="3200" i="1" dirty="0" smtClean="0"/>
+              <a:rPr lang="en-US" sz="3200" i="1" dirty="0"/>
               <a:t>get</a:t>
             </a:r>
             <a:r>
-              <a:rPr lang="en-US" sz="3200" dirty="0" smtClean="0"/>
+              <a:rPr lang="en-US" sz="3200" dirty="0"/>
               <a:t> and </a:t>
             </a:r>
             <a:r>
-              <a:rPr lang="en-US" sz="3200" i="1" dirty="0" smtClean="0"/>
+              <a:rPr lang="en-US" sz="3200" i="1" dirty="0"/>
               <a:t>set</a:t>
             </a:r>
             <a:r>
-              <a:rPr lang="en-US" sz="3200" dirty="0" smtClean="0"/>
+              <a:rPr lang="en-US" sz="3200" dirty="0"/>
               <a:t> property values</a:t>
             </a:r>
           </a:p>
           <a:p>
             <a:r>
-              <a:rPr lang="en-US" sz="3200" dirty="0" smtClean="0"/>
+              <a:rPr lang="en-US" sz="3200" dirty="0"/>
               <a:t>These are like in DOM manipulation:</a:t>
             </a:r>
           </a:p>
@@ -41011,7 +40594,7 @@
           <a:p>
             <a:pPr marL="742950" lvl="1" indent="-285750"/>
             <a:r>
-              <a:rPr lang="en-US" sz="2800" dirty="0" err="1" smtClean="0">
+              <a:rPr lang="en-US" sz="2800" dirty="0" err="1">
                 <a:solidFill>
                   <a:srgbClr val="000000"/>
                 </a:solidFill>
@@ -41019,7 +40602,7 @@
               </a:rPr>
               <a:t>input.value</a:t>
             </a:r>
-            <a:endParaRPr lang="en-US" sz="2800" dirty="0" smtClean="0"/>
+            <a:endParaRPr lang="en-US" sz="2800" dirty="0"/>
           </a:p>
           <a:p>
             <a:endParaRPr lang="en-US" dirty="0"/>
@@ -41316,10 +40899,9 @@
           <a:lstStyle/>
           <a:p>
             <a:r>
-              <a:rPr lang="en-US" dirty="0" smtClean="0"/>
+              <a:rPr lang="en-US" dirty="0"/>
               <a:t>Accessing properties example</a:t>
             </a:r>
-            <a:endParaRPr lang="en-US" dirty="0"/>
           </a:p>
         </p:txBody>
       </p:sp>
@@ -41471,14 +41053,14 @@
             <a:pPr marL="57150" indent="0">
               <a:buNone/>
             </a:pPr>
-            <a:endParaRPr lang="en-US" dirty="0" smtClean="0"/>
+            <a:endParaRPr lang="en-US" dirty="0"/>
           </a:p>
           <a:p>
             <a:pPr marL="57150" indent="0">
               <a:buNone/>
             </a:pPr>
             <a:r>
-              <a:rPr lang="en-US" sz="3600" dirty="0" smtClean="0"/>
+              <a:rPr lang="en-US" sz="3600" dirty="0"/>
               <a:t>Setting: </a:t>
             </a:r>
             <a:r>
@@ -41506,19 +41088,10 @@
                 </a:solidFill>
                 <a:latin typeface="Consolas" panose="020B0609020204030204" pitchFamily="49" charset="0"/>
               </a:rPr>
-              <a:t>"Cleveland</a:t>
-            </a:r>
-            <a:r>
-              <a:rPr lang="en-US" sz="3600" dirty="0" smtClean="0">
-                <a:solidFill>
-                  <a:srgbClr val="A31515"/>
-                </a:solidFill>
-                <a:latin typeface="Consolas" panose="020B0609020204030204" pitchFamily="49" charset="0"/>
-              </a:rPr>
-              <a:t>"</a:t>
-            </a:r>
-            <a:r>
-              <a:rPr lang="en-US" sz="3600" dirty="0" smtClean="0">
+              <a:t>"Cleveland"</a:t>
+            </a:r>
+            <a:r>
+              <a:rPr lang="en-US" sz="3600" dirty="0">
                 <a:solidFill>
                   <a:srgbClr val="000000"/>
                 </a:solidFill>
@@ -41526,14 +41099,14 @@
               </a:rPr>
               <a:t>;</a:t>
             </a:r>
-            <a:endParaRPr lang="en-US" sz="3600" dirty="0" smtClean="0"/>
+            <a:endParaRPr lang="en-US" sz="3600" dirty="0"/>
           </a:p>
           <a:p>
             <a:pPr marL="57150" indent="0">
               <a:buNone/>
             </a:pPr>
             <a:r>
-              <a:rPr lang="en-US" sz="3600" dirty="0" smtClean="0"/>
+              <a:rPr lang="en-US" sz="3600" dirty="0"/>
               <a:t>Getting: </a:t>
             </a:r>
             <a:r>
@@ -41568,7 +41141,7 @@
             <a:pPr marL="57150" indent="0">
               <a:buNone/>
             </a:pPr>
-            <a:endParaRPr lang="en-US" dirty="0" smtClean="0"/>
+            <a:endParaRPr lang="en-US" dirty="0"/>
           </a:p>
         </p:txBody>
       </p:sp>
@@ -41635,7 +41208,7 @@
                 <a:spcPct val="0"/>
               </a:spcAft>
             </a:pPr>
-            <a:endParaRPr lang="en-US" sz="2400" dirty="0" err="1" smtClean="0">
+            <a:endParaRPr lang="en-US" sz="2400" dirty="0" err="1">
               <a:gradFill>
                 <a:gsLst>
                   <a:gs pos="0">
@@ -41795,7 +41368,7 @@
               <a:t>	City: </a:t>
             </a:r>
             <a:r>
-              <a:rPr lang="en-US" sz="2800" b="1" dirty="0" smtClean="0">
+              <a:rPr lang="en-US" sz="2800" b="1" dirty="0">
                 <a:solidFill>
                   <a:srgbClr val="A31515"/>
                 </a:solidFill>
@@ -41820,7 +41393,7 @@
               </a:buClr>
             </a:pPr>
             <a:r>
-              <a:rPr lang="en-US" sz="2800" dirty="0" smtClean="0">
+              <a:rPr lang="en-US" sz="2800" dirty="0">
                 <a:solidFill>
                   <a:srgbClr val="000000"/>
                 </a:solidFill>
@@ -41828,12 +41401,6 @@
               </a:rPr>
               <a:t>}</a:t>
             </a:r>
-            <a:endParaRPr lang="en-US" sz="2800" dirty="0">
-              <a:solidFill>
-                <a:srgbClr val="000000"/>
-              </a:solidFill>
-              <a:latin typeface="Consolas" panose="020B0609020204030204" pitchFamily="49" charset="0"/>
-            </a:endParaRPr>
           </a:p>
         </p:txBody>
       </p:sp>
@@ -42141,10 +41708,9 @@
           <a:lstStyle/>
           <a:p>
             <a:r>
-              <a:rPr lang="en-US" dirty="0" smtClean="0"/>
+              <a:rPr lang="en-US" dirty="0"/>
               <a:t>Objects example</a:t>
             </a:r>
-            <a:endParaRPr lang="en-US" dirty="0"/>
           </a:p>
         </p:txBody>
       </p:sp>
@@ -42191,13 +41757,6 @@
   <p:transition>
     <p:fade/>
   </p:transition>
-  <p:timing>
-    <p:tnLst>
-      <p:par>
-        <p:cTn id="1" dur="indefinite" restart="never" nodeType="tmRoot"/>
-      </p:par>
-    </p:tnLst>
-  </p:timing>
 </p:sld>
 </file>
 
@@ -42234,10 +41793,9 @@
           <a:lstStyle/>
           <a:p>
             <a:r>
-              <a:rPr lang="en-US" dirty="0" smtClean="0"/>
+              <a:rPr lang="en-US" dirty="0"/>
               <a:t>Mini-quiz</a:t>
             </a:r>
-            <a:endParaRPr lang="en-US" dirty="0"/>
           </a:p>
         </p:txBody>
       </p:sp>
@@ -42487,7 +42045,7 @@
               <a:buNone/>
             </a:pPr>
             <a:r>
-              <a:rPr lang="en-US" sz="3600" dirty="0" smtClean="0">
+              <a:rPr lang="en-US" sz="3600" dirty="0">
                 <a:solidFill>
                   <a:srgbClr val="000000"/>
                 </a:solidFill>
@@ -42495,12 +42053,6 @@
               </a:rPr>
               <a:t>}</a:t>
             </a:r>
-            <a:endParaRPr lang="en-US" sz="3600" dirty="0">
-              <a:solidFill>
-                <a:srgbClr val="000000"/>
-              </a:solidFill>
-              <a:latin typeface="Consolas" panose="020B0609020204030204" pitchFamily="49" charset="0"/>
-            </a:endParaRPr>
           </a:p>
         </p:txBody>
       </p:sp>
@@ -42556,21 +42108,8 @@
                   <a:srgbClr val="56565A"/>
                 </a:solidFill>
               </a:rPr>
-              <a:t> the departure city from this object</a:t>
-            </a:r>
-            <a:r>
-              <a:rPr lang="en-US" sz="2800" dirty="0" smtClean="0">
-                <a:solidFill>
-                  <a:srgbClr val="56565A"/>
-                </a:solidFill>
-              </a:rPr>
-              <a:t>?</a:t>
-            </a:r>
-            <a:endParaRPr lang="en-US" sz="2800" dirty="0">
-              <a:solidFill>
-                <a:srgbClr val="56565A"/>
-              </a:solidFill>
-            </a:endParaRPr>
+              <a:t> the departure city from this object?</a:t>
+            </a:r>
           </a:p>
         </p:txBody>
       </p:sp>
@@ -42628,13 +42167,6 @@
   <p:transition>
     <p:fade/>
   </p:transition>
-  <p:timing>
-    <p:tnLst>
-      <p:par>
-        <p:cTn id="1" dur="indefinite" restart="never" nodeType="tmRoot"/>
-      </p:par>
-    </p:tnLst>
-  </p:timing>
 </p:sld>
 </file>
 
@@ -42671,10 +42203,9 @@
           <a:lstStyle/>
           <a:p>
             <a:r>
-              <a:rPr lang="en-US" dirty="0" smtClean="0"/>
+              <a:rPr lang="en-US" dirty="0"/>
               <a:t>Mini-quiz</a:t>
             </a:r>
-            <a:endParaRPr lang="en-US" dirty="0"/>
           </a:p>
         </p:txBody>
       </p:sp>
@@ -42924,7 +42455,7 @@
               <a:buNone/>
             </a:pPr>
             <a:r>
-              <a:rPr lang="en-US" sz="3600" dirty="0" smtClean="0">
+              <a:rPr lang="en-US" sz="3600" dirty="0">
                 <a:solidFill>
                   <a:srgbClr val="000000"/>
                 </a:solidFill>
@@ -42932,12 +42463,6 @@
               </a:rPr>
               <a:t>}</a:t>
             </a:r>
-            <a:endParaRPr lang="en-US" sz="3600" dirty="0">
-              <a:solidFill>
-                <a:srgbClr val="000000"/>
-              </a:solidFill>
-              <a:latin typeface="Consolas" panose="020B0609020204030204" pitchFamily="49" charset="0"/>
-            </a:endParaRPr>
           </a:p>
         </p:txBody>
       </p:sp>
@@ -42972,7 +42497,7 @@
               </a:buClr>
             </a:pPr>
             <a:r>
-              <a:rPr lang="en-US" sz="4400" dirty="0" err="1" smtClean="0">
+              <a:rPr lang="en-US" sz="4400" dirty="0" err="1">
                 <a:solidFill>
                   <a:schemeClr val="accent5">
                     <a:lumMod val="10000"/>
@@ -43047,13 +42572,6 @@
   <p:transition>
     <p:fade/>
   </p:transition>
-  <p:timing>
-    <p:tnLst>
-      <p:par>
-        <p:cTn id="1" dur="indefinite" restart="never" nodeType="tmRoot"/>
-      </p:par>
-    </p:tnLst>
-  </p:timing>
 </p:sld>
 </file>
 
@@ -43090,10 +42608,9 @@
           <a:lstStyle/>
           <a:p>
             <a:r>
-              <a:rPr lang="en-US" dirty="0" smtClean="0"/>
+              <a:rPr lang="en-US" dirty="0"/>
               <a:t>Mini-quiz</a:t>
             </a:r>
-            <a:endParaRPr lang="en-US" dirty="0"/>
           </a:p>
         </p:txBody>
       </p:sp>
@@ -43343,7 +42860,7 @@
               <a:buNone/>
             </a:pPr>
             <a:r>
-              <a:rPr lang="en-US" sz="3600" dirty="0" smtClean="0">
+              <a:rPr lang="en-US" sz="3600" dirty="0">
                 <a:solidFill>
                   <a:srgbClr val="000000"/>
                 </a:solidFill>
@@ -43351,12 +42868,6 @@
               </a:rPr>
               <a:t>}</a:t>
             </a:r>
-            <a:endParaRPr lang="en-US" sz="3600" dirty="0">
-              <a:solidFill>
-                <a:srgbClr val="000000"/>
-              </a:solidFill>
-              <a:latin typeface="Consolas" panose="020B0609020204030204" pitchFamily="49" charset="0"/>
-            </a:endParaRPr>
           </a:p>
         </p:txBody>
       </p:sp>
@@ -43412,37 +42923,8 @@
                   <a:srgbClr val="56565A"/>
                 </a:solidFill>
               </a:rPr>
-              <a:t> the </a:t>
-            </a:r>
-            <a:r>
-              <a:rPr lang="en-US" sz="2800" dirty="0" smtClean="0">
-                <a:solidFill>
-                  <a:srgbClr val="56565A"/>
-                </a:solidFill>
-              </a:rPr>
-              <a:t>arrival </a:t>
-            </a:r>
-            <a:r>
-              <a:rPr lang="en-US" sz="2800" dirty="0">
-                <a:solidFill>
-                  <a:srgbClr val="56565A"/>
-                </a:solidFill>
-              </a:rPr>
-              <a:t>city from this object</a:t>
-            </a:r>
-            <a:r>
-              <a:rPr lang="en-US" sz="2800" dirty="0" smtClean="0">
-                <a:solidFill>
-                  <a:srgbClr val="56565A"/>
-                </a:solidFill>
-              </a:rPr>
-              <a:t>?</a:t>
-            </a:r>
-            <a:endParaRPr lang="en-US" sz="2800" dirty="0">
-              <a:solidFill>
-                <a:srgbClr val="56565A"/>
-              </a:solidFill>
-            </a:endParaRPr>
+              <a:t> the arrival city from this object?</a:t>
+            </a:r>
           </a:p>
         </p:txBody>
       </p:sp>
@@ -43500,13 +42982,6 @@
   <p:transition>
     <p:fade/>
   </p:transition>
-  <p:timing>
-    <p:tnLst>
-      <p:par>
-        <p:cTn id="1" dur="indefinite" restart="never" nodeType="tmRoot"/>
-      </p:par>
-    </p:tnLst>
-  </p:timing>
 </p:sld>
 </file>
 

</xml_diff>